<commit_message>
Pres right before presenting
</commit_message>
<xml_diff>
--- a/Presentation/Project 1.pptx
+++ b/Presentation/Project 1.pptx
@@ -23,16 +23,17 @@
     <p:sldId id="268" r:id="rId18"/>
     <p:sldId id="269" r:id="rId19"/>
     <p:sldId id="270" r:id="rId20"/>
+    <p:sldId id="271" r:id="rId21"/>
   </p:sldIdLst>
   <p:sldSz cy="5143500" cx="9144000"/>
   <p:notesSz cx="6858000" cy="9144000"/>
   <p:embeddedFontLst>
     <p:embeddedFont>
       <p:font typeface="Nunito"/>
-      <p:regular r:id="rId21"/>
-      <p:bold r:id="rId22"/>
-      <p:italic r:id="rId23"/>
-      <p:boldItalic r:id="rId24"/>
+      <p:regular r:id="rId22"/>
+      <p:bold r:id="rId23"/>
+      <p:italic r:id="rId24"/>
+      <p:boldItalic r:id="rId25"/>
     </p:embeddedFont>
   </p:embeddedFontLst>
   <p:defaultTextStyle>
@@ -869,7 +870,7 @@
   <p:cSld>
     <p:spTree>
       <p:nvGrpSpPr>
-        <p:cNvPr id="278" name="Shape 278"/>
+        <p:cNvPr id="277" name="Shape 277"/>
         <p:cNvGrpSpPr/>
         <p:nvPr/>
       </p:nvGrpSpPr>
@@ -883,7 +884,7 @@
       </p:grpSpPr>
       <p:sp>
         <p:nvSpPr>
-          <p:cNvPr id="279" name="Google Shape;279;g123bd5c0c69_0_5:notes"/>
+          <p:cNvPr id="278" name="Google Shape;278;g123bd5c0c69_0_5:notes"/>
           <p:cNvSpPr/>
           <p:nvPr>
             <p:ph idx="2" type="sldImg"/>
@@ -918,7 +919,7 @@
       </p:sp>
       <p:sp>
         <p:nvSpPr>
-          <p:cNvPr id="280" name="Google Shape;280;g123bd5c0c69_0_5:notes"/>
+          <p:cNvPr id="279" name="Google Shape;279;g123bd5c0c69_0_5:notes"/>
           <p:cNvSpPr txBox="1"/>
           <p:nvPr>
             <p:ph idx="1" type="body"/>
@@ -981,7 +982,55 @@
             </a:pPr>
             <a:r>
               <a:rPr lang="en"/>
-              <a:t>Modified the peaks found using a Peak finder we filtered these down using Laramie’s </a:t>
+              <a:t>Here shows all the peaks in the VIX, this is far too much noise and unusable so we </a:t>
+            </a:r>
+            <a:r>
+              <a:rPr lang="en"/>
+              <a:t>filtered </a:t>
+            </a:r>
+            <a:endParaRPr>
+              <a:solidFill>
+                <a:schemeClr val="dk1"/>
+              </a:solidFill>
+            </a:endParaRPr>
+          </a:p>
+          <a:p>
+            <a:pPr indent="0" lvl="0" marL="0" rtl="0" algn="l">
+              <a:spcBef>
+                <a:spcPts val="0"/>
+              </a:spcBef>
+              <a:spcAft>
+                <a:spcPts val="0"/>
+              </a:spcAft>
+              <a:buNone/>
+            </a:pPr>
+            <a:r>
+              <a:rPr lang="en">
+                <a:solidFill>
+                  <a:schemeClr val="dk1"/>
+                </a:solidFill>
+              </a:rPr>
+              <a:t>* </a:t>
+            </a:r>
+            <a:endParaRPr>
+              <a:solidFill>
+                <a:schemeClr val="dk1"/>
+              </a:solidFill>
+            </a:endParaRPr>
+          </a:p>
+          <a:p>
+            <a:pPr indent="0" lvl="0" marL="0" rtl="0" algn="l">
+              <a:spcBef>
+                <a:spcPts val="0"/>
+              </a:spcBef>
+              <a:spcAft>
+                <a:spcPts val="0"/>
+              </a:spcAft>
+              <a:buNone/>
+            </a:pPr>
+            <a:r>
+              <a:rPr lang="en"/>
+              <a:t>the peaks down using Laramie’s </a:t>
             </a:r>
             <a:r>
               <a:rPr lang="en"/>
@@ -989,7 +1038,7 @@
             </a:r>
             <a:r>
               <a:rPr lang="en"/>
-              <a:t> noise as well as using rolling mean and standard deviation we were able to better capture the significant peaks of the VIX</a:t>
+              <a:t> noise as well as using rolling mean and standard deviation. Using these techniques we were able to better capture the significant peaks of the VIX</a:t>
             </a:r>
             <a:endParaRPr/>
           </a:p>
@@ -1008,7 +1057,7 @@
   <p:cSld>
     <p:spTree>
       <p:nvGrpSpPr>
-        <p:cNvPr id="300" name="Shape 300"/>
+        <p:cNvPr id="299" name="Shape 299"/>
         <p:cNvGrpSpPr/>
         <p:nvPr/>
       </p:nvGrpSpPr>
@@ -1022,7 +1071,7 @@
       </p:grpSpPr>
       <p:sp>
         <p:nvSpPr>
-          <p:cNvPr id="301" name="Google Shape;301;g1231efbba45_0_61:notes"/>
+          <p:cNvPr id="300" name="Google Shape;300;g1231efbba45_0_61:notes"/>
           <p:cNvSpPr/>
           <p:nvPr>
             <p:ph idx="2" type="sldImg"/>
@@ -1057,7 +1106,7 @@
       </p:sp>
       <p:sp>
         <p:nvSpPr>
-          <p:cNvPr id="302" name="Google Shape;302;g1231efbba45_0_61:notes"/>
+          <p:cNvPr id="301" name="Google Shape;301;g1231efbba45_0_61:notes"/>
           <p:cNvSpPr txBox="1"/>
           <p:nvPr>
             <p:ph idx="1" type="body"/>
@@ -1246,6 +1295,83 @@
               <a:buNone/>
             </a:pPr>
             <a:r>
+              <a:t/>
+            </a:r>
+            <a:endParaRPr>
+              <a:solidFill>
+                <a:schemeClr val="dk1"/>
+              </a:solidFill>
+            </a:endParaRPr>
+          </a:p>
+          <a:p>
+            <a:pPr indent="0" lvl="0" marL="0" rtl="0" algn="l">
+              <a:spcBef>
+                <a:spcPts val="0"/>
+              </a:spcBef>
+              <a:spcAft>
+                <a:spcPts val="0"/>
+              </a:spcAft>
+              <a:buClr>
+                <a:schemeClr val="dk1"/>
+              </a:buClr>
+              <a:buSzPts val="1100"/>
+              <a:buFont typeface="Arial"/>
+              <a:buNone/>
+            </a:pPr>
+            <a:r>
+              <a:rPr lang="en">
+                <a:solidFill>
+                  <a:schemeClr val="dk1"/>
+                </a:solidFill>
+              </a:rPr>
+              <a:t>So if I go to the far left of this graph, waiting a minimal time until till I see a peak. Of course, when you immediately find yourself seeing a spike in the VIX, the fall in the S&amp;P will be your best price. As you expand the window you have waited until you see a VIX peak - the odds of the next VIX peak being significant enough to be a better investment than an earlier one decreases. So as you get to an expanded window of, say, a year, you need a VIX spike like the pandemic to make the time you waited worth it.</a:t>
+            </a:r>
+            <a:endParaRPr>
+              <a:solidFill>
+                <a:schemeClr val="dk1"/>
+              </a:solidFill>
+            </a:endParaRPr>
+          </a:p>
+          <a:p>
+            <a:pPr indent="0" lvl="0" marL="0" rtl="0" algn="l">
+              <a:spcBef>
+                <a:spcPts val="0"/>
+              </a:spcBef>
+              <a:spcAft>
+                <a:spcPts val="0"/>
+              </a:spcAft>
+              <a:buClr>
+                <a:schemeClr val="dk1"/>
+              </a:buClr>
+              <a:buSzPts val="1100"/>
+              <a:buFont typeface="Arial"/>
+              <a:buNone/>
+            </a:pPr>
+            <a:r>
+              <a:t/>
+            </a:r>
+            <a:endParaRPr>
+              <a:solidFill>
+                <a:schemeClr val="dk1"/>
+              </a:solidFill>
+            </a:endParaRPr>
+          </a:p>
+          <a:p>
+            <a:pPr indent="0" lvl="0" marL="0" rtl="0" algn="l">
+              <a:spcBef>
+                <a:spcPts val="0"/>
+              </a:spcBef>
+              <a:spcAft>
+                <a:spcPts val="0"/>
+              </a:spcAft>
+              <a:buClr>
+                <a:schemeClr val="dk1"/>
+              </a:buClr>
+              <a:buSzPts val="1100"/>
+              <a:buFont typeface="Arial"/>
+              <a:buNone/>
+            </a:pPr>
+            <a:r>
               <a:rPr lang="en">
                 <a:solidFill>
                   <a:schemeClr val="dk1"/>
@@ -1309,7 +1435,7 @@
                   <a:schemeClr val="dk1"/>
                 </a:solidFill>
               </a:rPr>
-              <a:t>*With the critical turning point  around a month</a:t>
+              <a:t>*With the critical drop right around the end of a month</a:t>
             </a:r>
             <a:endParaRPr>
               <a:solidFill>
@@ -1342,7 +1468,7 @@
                 <a:cs typeface="Calibri"/>
                 <a:sym typeface="Calibri"/>
               </a:rPr>
-              <a:t>Since you can expect the next peak to happen within 35 calendar days of the last,</a:t>
+              <a:t>Since you can expect the next peak to happen within 35 calendar days of the last, long term investors should</a:t>
             </a:r>
             <a:endParaRPr sz="1400">
               <a:solidFill>
@@ -1379,7 +1505,7 @@
                 <a:cs typeface="Calibri"/>
                 <a:sym typeface="Calibri"/>
               </a:rPr>
-              <a:t>* waiting 30 trading sessions maximizes your odds of buying the best price for the S&amp;P inside of a VIX spike</a:t>
+              <a:t>* wait 30 trading sessions from the last peak maximizes your odds of buying the best price given the natural rise of the S&amp;P</a:t>
             </a:r>
             <a:endParaRPr>
               <a:solidFill>
@@ -1402,7 +1528,7 @@
   <p:cSld>
     <p:spTree>
       <p:nvGrpSpPr>
-        <p:cNvPr id="313" name="Shape 313"/>
+        <p:cNvPr id="312" name="Shape 312"/>
         <p:cNvGrpSpPr/>
         <p:nvPr/>
       </p:nvGrpSpPr>
@@ -1416,7 +1542,7 @@
       </p:grpSpPr>
       <p:sp>
         <p:nvSpPr>
-          <p:cNvPr id="314" name="Google Shape;314;g121a0b03b78_3_4:notes"/>
+          <p:cNvPr id="313" name="Google Shape;313;g121a0b03b78_3_4:notes"/>
           <p:cNvSpPr/>
           <p:nvPr>
             <p:ph idx="2" type="sldImg"/>
@@ -1451,7 +1577,7 @@
       </p:sp>
       <p:sp>
         <p:nvSpPr>
-          <p:cNvPr id="315" name="Google Shape;315;g121a0b03b78_3_4:notes"/>
+          <p:cNvPr id="314" name="Google Shape;314;g121a0b03b78_3_4:notes"/>
           <p:cNvSpPr txBox="1"/>
           <p:nvPr>
             <p:ph idx="1" type="body"/>
@@ -1501,7 +1627,7 @@
   <p:cSld>
     <p:spTree>
       <p:nvGrpSpPr>
-        <p:cNvPr id="323" name="Shape 323"/>
+        <p:cNvPr id="322" name="Shape 322"/>
         <p:cNvGrpSpPr/>
         <p:nvPr/>
       </p:nvGrpSpPr>
@@ -1515,7 +1641,7 @@
       </p:grpSpPr>
       <p:sp>
         <p:nvSpPr>
-          <p:cNvPr id="324" name="Google Shape;324;g121a0b03b78_7_9:notes"/>
+          <p:cNvPr id="323" name="Google Shape;323;g121a0b03b78_7_9:notes"/>
           <p:cNvSpPr/>
           <p:nvPr>
             <p:ph idx="2" type="sldImg"/>
@@ -1550,7 +1676,7 @@
       </p:sp>
       <p:sp>
         <p:nvSpPr>
-          <p:cNvPr id="325" name="Google Shape;325;g121a0b03b78_7_9:notes"/>
+          <p:cNvPr id="324" name="Google Shape;324;g121a0b03b78_7_9:notes"/>
           <p:cNvSpPr txBox="1"/>
           <p:nvPr>
             <p:ph idx="1" type="body"/>
@@ -1600,7 +1726,7 @@
   <p:cSld>
     <p:spTree>
       <p:nvGrpSpPr>
-        <p:cNvPr id="339" name="Shape 339"/>
+        <p:cNvPr id="338" name="Shape 338"/>
         <p:cNvGrpSpPr/>
         <p:nvPr/>
       </p:nvGrpSpPr>
@@ -1614,7 +1740,7 @@
       </p:grpSpPr>
       <p:sp>
         <p:nvSpPr>
-          <p:cNvPr id="340" name="Google Shape;340;g121a0b03b78_7_28:notes"/>
+          <p:cNvPr id="339" name="Google Shape;339;g121a0b03b78_7_28:notes"/>
           <p:cNvSpPr/>
           <p:nvPr>
             <p:ph idx="2" type="sldImg"/>
@@ -1649,7 +1775,7 @@
       </p:sp>
       <p:sp>
         <p:nvSpPr>
-          <p:cNvPr id="341" name="Google Shape;341;g121a0b03b78_7_28:notes"/>
+          <p:cNvPr id="340" name="Google Shape;340;g121a0b03b78_7_28:notes"/>
           <p:cNvSpPr txBox="1"/>
           <p:nvPr>
             <p:ph idx="1" type="body"/>
@@ -1699,7 +1825,7 @@
   <p:cSld>
     <p:spTree>
       <p:nvGrpSpPr>
-        <p:cNvPr id="348" name="Shape 348"/>
+        <p:cNvPr id="347" name="Shape 347"/>
         <p:cNvGrpSpPr/>
         <p:nvPr/>
       </p:nvGrpSpPr>
@@ -1713,7 +1839,7 @@
       </p:grpSpPr>
       <p:sp>
         <p:nvSpPr>
-          <p:cNvPr id="349" name="Google Shape;349;g123bd5c0c69_0_45:notes"/>
+          <p:cNvPr id="348" name="Google Shape;348;g121a0b03b78_7_46:notes"/>
           <p:cNvSpPr/>
           <p:nvPr>
             <p:ph idx="2" type="sldImg"/>
@@ -1748,7 +1874,106 @@
       </p:sp>
       <p:sp>
         <p:nvSpPr>
-          <p:cNvPr id="350" name="Google Shape;350;g123bd5c0c69_0_45:notes"/>
+          <p:cNvPr id="349" name="Google Shape;349;g121a0b03b78_7_46:notes"/>
+          <p:cNvSpPr txBox="1"/>
+          <p:nvPr>
+            <p:ph idx="1" type="body"/>
+          </p:nvPr>
+        </p:nvSpPr>
+        <p:spPr>
+          <a:xfrm>
+            <a:off x="685800" y="4343400"/>
+            <a:ext cx="5486400" cy="4114800"/>
+          </a:xfrm>
+          <a:prstGeom prst="rect">
+            <a:avLst/>
+          </a:prstGeom>
+        </p:spPr>
+        <p:txBody>
+          <a:bodyPr anchorCtr="0" anchor="t" bIns="91425" lIns="91425" spcFirstLastPara="1" rIns="91425" wrap="square" tIns="91425">
+            <a:noAutofit/>
+          </a:bodyPr>
+          <a:lstStyle/>
+          <a:p>
+            <a:pPr indent="0" lvl="0" marL="0" rtl="0" algn="l">
+              <a:spcBef>
+                <a:spcPts val="0"/>
+              </a:spcBef>
+              <a:spcAft>
+                <a:spcPts val="0"/>
+              </a:spcAft>
+              <a:buNone/>
+            </a:pPr>
+            <a:r>
+              <a:t/>
+            </a:r>
+            <a:endParaRPr/>
+          </a:p>
+        </p:txBody>
+      </p:sp>
+    </p:spTree>
+  </p:cSld>
+  <p:clrMapOvr>
+    <a:masterClrMapping/>
+  </p:clrMapOvr>
+</p:notes>
+</file>
+
+<file path=ppt/notesSlides/notesSlide16.xml><?xml version="1.0" encoding="utf-8"?>
+<p:notes xmlns:a="http://schemas.openxmlformats.org/drawingml/2006/main" xmlns:r="http://schemas.openxmlformats.org/officeDocument/2006/relationships" xmlns:mc="http://schemas.openxmlformats.org/markup-compatibility/2006" xmlns:mv="urn:schemas-microsoft-com:mac:vml" xmlns:p="http://schemas.openxmlformats.org/presentationml/2006/main" xmlns:c="http://schemas.openxmlformats.org/drawingml/2006/chart" xmlns:dgm="http://schemas.openxmlformats.org/drawingml/2006/diagram" xmlns:o="urn:schemas-microsoft-com:office:office" xmlns:v="urn:schemas-microsoft-com:vml" xmlns:pvml="urn:schemas-microsoft-com:office:powerpoint" xmlns:com="http://schemas.openxmlformats.org/drawingml/2006/compatibility" xmlns:p14="http://schemas.microsoft.com/office/powerpoint/2010/main" xmlns:p15="http://schemas.microsoft.com/office/powerpoint/2012/main" xmlns:ahyp="http://schemas.microsoft.com/office/drawing/2018/hyperlinkcolor" showMasterPhAnim="0" showMasterSp="0">
+  <p:cSld>
+    <p:spTree>
+      <p:nvGrpSpPr>
+        <p:cNvPr id="355" name="Shape 355"/>
+        <p:cNvGrpSpPr/>
+        <p:nvPr/>
+      </p:nvGrpSpPr>
+      <p:grpSpPr>
+        <a:xfrm>
+          <a:off x="0" y="0"/>
+          <a:ext cx="0" cy="0"/>
+          <a:chOff x="0" y="0"/>
+          <a:chExt cx="0" cy="0"/>
+        </a:xfrm>
+      </p:grpSpPr>
+      <p:sp>
+        <p:nvSpPr>
+          <p:cNvPr id="356" name="Google Shape;356;g123bd5c0c69_0_45:notes"/>
+          <p:cNvSpPr/>
+          <p:nvPr>
+            <p:ph idx="2" type="sldImg"/>
+          </p:nvPr>
+        </p:nvSpPr>
+        <p:spPr>
+          <a:xfrm>
+            <a:off x="381300" y="685800"/>
+            <a:ext cx="6096000" cy="3429000"/>
+          </a:xfrm>
+          <a:custGeom>
+            <a:rect b="b" l="l" r="r" t="t"/>
+            <a:pathLst>
+              <a:path extrusionOk="0" h="120000" w="120000">
+                <a:moveTo>
+                  <a:pt x="0" y="0"/>
+                </a:moveTo>
+                <a:lnTo>
+                  <a:pt x="120000" y="0"/>
+                </a:lnTo>
+                <a:lnTo>
+                  <a:pt x="120000" y="120000"/>
+                </a:lnTo>
+                <a:lnTo>
+                  <a:pt x="0" y="120000"/>
+                </a:lnTo>
+                <a:close/>
+              </a:path>
+            </a:pathLst>
+          </a:custGeom>
+        </p:spPr>
+      </p:sp>
+      <p:sp>
+        <p:nvSpPr>
+          <p:cNvPr id="357" name="Google Shape;357;g123bd5c0c69_0_45:notes"/>
           <p:cNvSpPr txBox="1"/>
           <p:nvPr>
             <p:ph idx="1" type="body"/>
@@ -2502,7 +2727,7 @@
             </a:r>
             <a:r>
               <a:rPr lang="en"/>
-              <a:t> at the beginning or end of a bear trend, buying at the beginning of a bear trend would have less returns then buying at the end of a bear trend</a:t>
+              <a:t> at the beginning or end of a bear trend, buying at the beginning of a bear trend would have less returns then buying at the end of a bear trend. Since spikes occur rapidly this causes this bimodal behavior</a:t>
             </a:r>
             <a:endParaRPr/>
           </a:p>
@@ -11100,7 +11325,7 @@
   <p:cSld>
     <p:spTree>
       <p:nvGrpSpPr>
-        <p:cNvPr id="281" name="Shape 281"/>
+        <p:cNvPr id="280" name="Shape 280"/>
         <p:cNvGrpSpPr/>
         <p:nvPr/>
       </p:nvGrpSpPr>
@@ -11114,7 +11339,7 @@
       </p:grpSpPr>
       <p:pic>
         <p:nvPicPr>
-          <p:cNvPr id="282" name="Google Shape;282;p22"/>
+          <p:cNvPr id="281" name="Google Shape;281;p22"/>
           <p:cNvPicPr preferRelativeResize="0"/>
           <p:nvPr/>
         </p:nvPicPr>
@@ -11142,7 +11367,7 @@
       </p:pic>
       <p:pic>
         <p:nvPicPr>
-          <p:cNvPr id="283" name="Google Shape;283;p22"/>
+          <p:cNvPr id="282" name="Google Shape;282;p22"/>
           <p:cNvPicPr preferRelativeResize="0"/>
           <p:nvPr/>
         </p:nvPicPr>
@@ -11170,7 +11395,7 @@
       </p:pic>
       <p:sp>
         <p:nvSpPr>
-          <p:cNvPr id="284" name="Google Shape;284;p22"/>
+          <p:cNvPr id="283" name="Google Shape;283;p22"/>
           <p:cNvSpPr txBox="1"/>
           <p:nvPr/>
         </p:nvSpPr>
@@ -11222,7 +11447,7 @@
       </p:sp>
       <p:sp>
         <p:nvSpPr>
-          <p:cNvPr id="285" name="Google Shape;285;p22"/>
+          <p:cNvPr id="284" name="Google Shape;284;p22"/>
           <p:cNvSpPr/>
           <p:nvPr/>
         </p:nvSpPr>
@@ -11274,7 +11499,7 @@
       </p:sp>
       <p:sp>
         <p:nvSpPr>
-          <p:cNvPr id="286" name="Google Shape;286;p22"/>
+          <p:cNvPr id="285" name="Google Shape;285;p22"/>
           <p:cNvSpPr/>
           <p:nvPr/>
         </p:nvSpPr>
@@ -11326,7 +11551,7 @@
       </p:sp>
       <p:sp>
         <p:nvSpPr>
-          <p:cNvPr id="287" name="Google Shape;287;p22"/>
+          <p:cNvPr id="286" name="Google Shape;286;p22"/>
           <p:cNvSpPr/>
           <p:nvPr/>
         </p:nvSpPr>
@@ -11378,7 +11603,7 @@
       </p:sp>
       <p:sp>
         <p:nvSpPr>
-          <p:cNvPr id="288" name="Google Shape;288;p22"/>
+          <p:cNvPr id="287" name="Google Shape;287;p22"/>
           <p:cNvSpPr/>
           <p:nvPr/>
         </p:nvSpPr>
@@ -11430,7 +11655,7 @@
       </p:sp>
       <p:sp>
         <p:nvSpPr>
-          <p:cNvPr id="289" name="Google Shape;289;p22"/>
+          <p:cNvPr id="288" name="Google Shape;288;p22"/>
           <p:cNvSpPr/>
           <p:nvPr/>
         </p:nvSpPr>
@@ -11482,7 +11707,7 @@
       </p:sp>
       <p:sp>
         <p:nvSpPr>
-          <p:cNvPr id="290" name="Google Shape;290;p22"/>
+          <p:cNvPr id="289" name="Google Shape;289;p22"/>
           <p:cNvSpPr/>
           <p:nvPr/>
         </p:nvSpPr>
@@ -11534,7 +11759,7 @@
       </p:sp>
       <p:sp>
         <p:nvSpPr>
-          <p:cNvPr id="291" name="Google Shape;291;p22"/>
+          <p:cNvPr id="290" name="Google Shape;290;p22"/>
           <p:cNvSpPr/>
           <p:nvPr/>
         </p:nvSpPr>
@@ -11586,7 +11811,7 @@
       </p:sp>
       <p:sp>
         <p:nvSpPr>
-          <p:cNvPr id="292" name="Google Shape;292;p22"/>
+          <p:cNvPr id="291" name="Google Shape;291;p22"/>
           <p:cNvSpPr/>
           <p:nvPr/>
         </p:nvSpPr>
@@ -11638,7 +11863,7 @@
       </p:sp>
       <p:sp>
         <p:nvSpPr>
-          <p:cNvPr id="293" name="Google Shape;293;p22"/>
+          <p:cNvPr id="292" name="Google Shape;292;p22"/>
           <p:cNvSpPr/>
           <p:nvPr/>
         </p:nvSpPr>
@@ -11690,7 +11915,7 @@
       </p:sp>
       <p:sp>
         <p:nvSpPr>
-          <p:cNvPr id="294" name="Google Shape;294;p22"/>
+          <p:cNvPr id="293" name="Google Shape;293;p22"/>
           <p:cNvSpPr/>
           <p:nvPr/>
         </p:nvSpPr>
@@ -11742,7 +11967,7 @@
       </p:sp>
       <p:sp>
         <p:nvSpPr>
-          <p:cNvPr id="295" name="Google Shape;295;p22"/>
+          <p:cNvPr id="294" name="Google Shape;294;p22"/>
           <p:cNvSpPr txBox="1"/>
           <p:nvPr/>
         </p:nvSpPr>
@@ -11833,7 +12058,7 @@
       </p:sp>
       <p:sp>
         <p:nvSpPr>
-          <p:cNvPr id="296" name="Google Shape;296;p22"/>
+          <p:cNvPr id="295" name="Google Shape;295;p22"/>
           <p:cNvSpPr/>
           <p:nvPr/>
         </p:nvSpPr>
@@ -11885,7 +12110,7 @@
       </p:sp>
       <p:sp>
         <p:nvSpPr>
-          <p:cNvPr id="297" name="Google Shape;297;p22"/>
+          <p:cNvPr id="296" name="Google Shape;296;p22"/>
           <p:cNvSpPr/>
           <p:nvPr/>
         </p:nvSpPr>
@@ -11937,7 +12162,7 @@
       </p:sp>
       <p:sp>
         <p:nvSpPr>
-          <p:cNvPr id="298" name="Google Shape;298;p22"/>
+          <p:cNvPr id="297" name="Google Shape;297;p22"/>
           <p:cNvSpPr/>
           <p:nvPr/>
         </p:nvSpPr>
@@ -11989,7 +12214,7 @@
       </p:sp>
       <p:sp>
         <p:nvSpPr>
-          <p:cNvPr id="299" name="Google Shape;299;p22"/>
+          <p:cNvPr id="298" name="Google Shape;298;p22"/>
           <p:cNvSpPr/>
           <p:nvPr/>
         </p:nvSpPr>
@@ -12081,7 +12306,7 @@
                                           </p:stCondLst>
                                         </p:cTn>
                                         <p:tgtEl>
-                                          <p:spTgt spid="283"/>
+                                          <p:spTgt spid="282"/>
                                         </p:tgtEl>
                                         <p:attrNameLst>
                                           <p:attrName>style.visibility</p:attrName>
@@ -12095,7 +12320,7 @@
                                       <p:cBhvr>
                                         <p:cTn dur="1000"/>
                                         <p:tgtEl>
-                                          <p:spTgt spid="283"/>
+                                          <p:spTgt spid="282"/>
                                         </p:tgtEl>
                                       </p:cBhvr>
                                     </p:animEffect>
@@ -12134,7 +12359,7 @@
                                           </p:stCondLst>
                                         </p:cTn>
                                         <p:tgtEl>
-                                          <p:spTgt spid="282"/>
+                                          <p:spTgt spid="281"/>
                                         </p:tgtEl>
                                         <p:attrNameLst>
                                           <p:attrName>style.visibility</p:attrName>
@@ -12148,7 +12373,7 @@
                                       <p:cBhvr>
                                         <p:cTn dur="1000"/>
                                         <p:tgtEl>
-                                          <p:spTgt spid="282"/>
+                                          <p:spTgt spid="281"/>
                                         </p:tgtEl>
                                       </p:cBhvr>
                                     </p:animEffect>
@@ -12165,7 +12390,7 @@
                                       <p:cBhvr>
                                         <p:cTn dur="1000"/>
                                         <p:tgtEl>
-                                          <p:spTgt spid="283"/>
+                                          <p:spTgt spid="282"/>
                                         </p:tgtEl>
                                       </p:cBhvr>
                                     </p:animEffect>
@@ -12177,7 +12402,7 @@
                                           </p:stCondLst>
                                         </p:cTn>
                                         <p:tgtEl>
-                                          <p:spTgt spid="283"/>
+                                          <p:spTgt spid="282"/>
                                         </p:tgtEl>
                                         <p:attrNameLst>
                                           <p:attrName>style.visibility</p:attrName>
@@ -12210,6 +12435,41 @@
                             <p:childTnLst>
                               <p:par>
                                 <p:cTn fill="hold" nodeType="clickEffect" presetClass="entr" presetID="10" presetSubtype="0">
+                                  <p:stCondLst>
+                                    <p:cond delay="0"/>
+                                  </p:stCondLst>
+                                  <p:childTnLst>
+                                    <p:set>
+                                      <p:cBhvr>
+                                        <p:cTn dur="1" fill="hold">
+                                          <p:stCondLst>
+                                            <p:cond delay="0"/>
+                                          </p:stCondLst>
+                                        </p:cTn>
+                                        <p:tgtEl>
+                                          <p:spTgt spid="284"/>
+                                        </p:tgtEl>
+                                        <p:attrNameLst>
+                                          <p:attrName>style.visibility</p:attrName>
+                                        </p:attrNameLst>
+                                      </p:cBhvr>
+                                      <p:to>
+                                        <p:strVal val="visible"/>
+                                      </p:to>
+                                    </p:set>
+                                    <p:animEffect filter="fade" transition="in">
+                                      <p:cBhvr>
+                                        <p:cTn dur="1000"/>
+                                        <p:tgtEl>
+                                          <p:spTgt spid="284"/>
+                                        </p:tgtEl>
+                                      </p:cBhvr>
+                                    </p:animEffect>
+                                  </p:childTnLst>
+                                </p:cTn>
+                              </p:par>
+                              <p:par>
+                                <p:cTn fill="hold" nodeType="withEffect" presetClass="entr" presetID="10" presetSubtype="0">
                                   <p:stCondLst>
                                     <p:cond delay="0"/>
                                   </p:stCondLst>
@@ -12467,7 +12727,7 @@
                                           </p:stCondLst>
                                         </p:cTn>
                                         <p:tgtEl>
-                                          <p:spTgt spid="292"/>
+                                          <p:spTgt spid="293"/>
                                         </p:tgtEl>
                                         <p:attrNameLst>
                                           <p:attrName>style.visibility</p:attrName>
@@ -12481,7 +12741,7 @@
                                       <p:cBhvr>
                                         <p:cTn dur="1000"/>
                                         <p:tgtEl>
-                                          <p:spTgt spid="292"/>
+                                          <p:spTgt spid="293"/>
                                         </p:tgtEl>
                                       </p:cBhvr>
                                     </p:animEffect>
@@ -12502,7 +12762,7 @@
                                           </p:stCondLst>
                                         </p:cTn>
                                         <p:tgtEl>
-                                          <p:spTgt spid="294"/>
+                                          <p:spTgt spid="295"/>
                                         </p:tgtEl>
                                         <p:attrNameLst>
                                           <p:attrName>style.visibility</p:attrName>
@@ -12516,7 +12776,7 @@
                                       <p:cBhvr>
                                         <p:cTn dur="1000"/>
                                         <p:tgtEl>
-                                          <p:spTgt spid="294"/>
+                                          <p:spTgt spid="295"/>
                                         </p:tgtEl>
                                       </p:cBhvr>
                                     </p:animEffect>
@@ -12642,7 +12902,7 @@
                                           </p:stCondLst>
                                         </p:cTn>
                                         <p:tgtEl>
-                                          <p:spTgt spid="299"/>
+                                          <p:spTgt spid="292"/>
                                         </p:tgtEl>
                                         <p:attrNameLst>
                                           <p:attrName>style.visibility</p:attrName>
@@ -12656,42 +12916,7 @@
                                       <p:cBhvr>
                                         <p:cTn dur="1000"/>
                                         <p:tgtEl>
-                                          <p:spTgt spid="299"/>
-                                        </p:tgtEl>
-                                      </p:cBhvr>
-                                    </p:animEffect>
-                                  </p:childTnLst>
-                                </p:cTn>
-                              </p:par>
-                              <p:par>
-                                <p:cTn fill="hold" nodeType="withEffect" presetClass="entr" presetID="10" presetSubtype="0">
-                                  <p:stCondLst>
-                                    <p:cond delay="0"/>
-                                  </p:stCondLst>
-                                  <p:childTnLst>
-                                    <p:set>
-                                      <p:cBhvr>
-                                        <p:cTn dur="1" fill="hold">
-                                          <p:stCondLst>
-                                            <p:cond delay="0"/>
-                                          </p:stCondLst>
-                                        </p:cTn>
-                                        <p:tgtEl>
-                                          <p:spTgt spid="293"/>
-                                        </p:tgtEl>
-                                        <p:attrNameLst>
-                                          <p:attrName>style.visibility</p:attrName>
-                                        </p:attrNameLst>
-                                      </p:cBhvr>
-                                      <p:to>
-                                        <p:strVal val="visible"/>
-                                      </p:to>
-                                    </p:set>
-                                    <p:animEffect filter="fade" transition="in">
-                                      <p:cBhvr>
-                                        <p:cTn dur="1000"/>
-                                        <p:tgtEl>
-                                          <p:spTgt spid="293"/>
+                                          <p:spTgt spid="292"/>
                                         </p:tgtEl>
                                       </p:cBhvr>
                                     </p:animEffect>
@@ -12721,7 +12946,7 @@
                                           </p:stCondLst>
                                         </p:cTn>
                                         <p:tgtEl>
-                                          <p:spTgt spid="295"/>
+                                          <p:spTgt spid="294"/>
                                         </p:tgtEl>
                                         <p:attrNameLst>
                                           <p:attrName>style.visibility</p:attrName>
@@ -12735,7 +12960,7 @@
                                       <p:cBhvr>
                                         <p:cTn dur="1000"/>
                                         <p:tgtEl>
-                                          <p:spTgt spid="295"/>
+                                          <p:spTgt spid="294"/>
                                         </p:tgtEl>
                                       </p:cBhvr>
                                     </p:animEffect>
@@ -12778,7 +13003,7 @@
   <p:cSld>
     <p:spTree>
       <p:nvGrpSpPr>
-        <p:cNvPr id="303" name="Shape 303"/>
+        <p:cNvPr id="302" name="Shape 302"/>
         <p:cNvGrpSpPr/>
         <p:nvPr/>
       </p:nvGrpSpPr>
@@ -12792,7 +13017,7 @@
       </p:grpSpPr>
       <p:sp>
         <p:nvSpPr>
-          <p:cNvPr id="304" name="Google Shape;304;p23"/>
+          <p:cNvPr id="303" name="Google Shape;303;p23"/>
           <p:cNvSpPr txBox="1"/>
           <p:nvPr>
             <p:ph type="title"/>
@@ -12832,7 +13057,7 @@
       </p:sp>
       <p:pic>
         <p:nvPicPr>
-          <p:cNvPr id="305" name="Google Shape;305;p23"/>
+          <p:cNvPr id="304" name="Google Shape;304;p23"/>
           <p:cNvPicPr preferRelativeResize="0"/>
           <p:nvPr/>
         </p:nvPicPr>
@@ -12860,7 +13085,7 @@
       </p:pic>
       <p:sp>
         <p:nvSpPr>
-          <p:cNvPr id="306" name="Google Shape;306;p23"/>
+          <p:cNvPr id="305" name="Google Shape;305;p23"/>
           <p:cNvSpPr txBox="1"/>
           <p:nvPr/>
         </p:nvSpPr>
@@ -12918,7 +13143,7 @@
       </p:sp>
       <p:cxnSp>
         <p:nvCxnSpPr>
-          <p:cNvPr id="307" name="Google Shape;307;p23"/>
+          <p:cNvPr id="306" name="Google Shape;306;p23"/>
           <p:cNvCxnSpPr/>
           <p:nvPr/>
         </p:nvCxnSpPr>
@@ -12944,7 +13169,7 @@
       </p:cxnSp>
       <p:cxnSp>
         <p:nvCxnSpPr>
-          <p:cNvPr id="308" name="Google Shape;308;p23"/>
+          <p:cNvPr id="307" name="Google Shape;307;p23"/>
           <p:cNvCxnSpPr/>
           <p:nvPr/>
         </p:nvCxnSpPr>
@@ -12970,7 +13195,7 @@
       </p:cxnSp>
       <p:cxnSp>
         <p:nvCxnSpPr>
-          <p:cNvPr id="309" name="Google Shape;309;p23"/>
+          <p:cNvPr id="308" name="Google Shape;308;p23"/>
           <p:cNvCxnSpPr/>
           <p:nvPr/>
         </p:nvCxnSpPr>
@@ -12996,7 +13221,7 @@
       </p:cxnSp>
       <p:cxnSp>
         <p:nvCxnSpPr>
-          <p:cNvPr id="310" name="Google Shape;310;p23"/>
+          <p:cNvPr id="309" name="Google Shape;309;p23"/>
           <p:cNvCxnSpPr/>
           <p:nvPr/>
         </p:nvCxnSpPr>
@@ -13022,7 +13247,7 @@
       </p:cxnSp>
       <p:sp>
         <p:nvSpPr>
-          <p:cNvPr id="311" name="Google Shape;311;p23"/>
+          <p:cNvPr id="310" name="Google Shape;310;p23"/>
           <p:cNvSpPr txBox="1"/>
           <p:nvPr/>
         </p:nvSpPr>
@@ -13086,7 +13311,7 @@
       </p:sp>
       <p:sp>
         <p:nvSpPr>
-          <p:cNvPr id="312" name="Google Shape;312;p23"/>
+          <p:cNvPr id="311" name="Google Shape;311;p23"/>
           <p:cNvSpPr txBox="1"/>
           <p:nvPr/>
         </p:nvSpPr>
@@ -13175,6 +13400,59 @@
                                           </p:stCondLst>
                                         </p:cTn>
                                         <p:tgtEl>
+                                          <p:spTgt spid="308"/>
+                                        </p:tgtEl>
+                                        <p:attrNameLst>
+                                          <p:attrName>style.visibility</p:attrName>
+                                        </p:attrNameLst>
+                                      </p:cBhvr>
+                                      <p:to>
+                                        <p:strVal val="visible"/>
+                                      </p:to>
+                                    </p:set>
+                                    <p:animEffect filter="fade" transition="in">
+                                      <p:cBhvr>
+                                        <p:cTn dur="1000"/>
+                                        <p:tgtEl>
+                                          <p:spTgt spid="308"/>
+                                        </p:tgtEl>
+                                      </p:cBhvr>
+                                    </p:animEffect>
+                                  </p:childTnLst>
+                                </p:cTn>
+                              </p:par>
+                            </p:childTnLst>
+                          </p:cTn>
+                        </p:par>
+                      </p:childTnLst>
+                    </p:cTn>
+                  </p:par>
+                  <p:par>
+                    <p:cTn fill="hold">
+                      <p:stCondLst>
+                        <p:cond delay="indefinite"/>
+                      </p:stCondLst>
+                      <p:childTnLst>
+                        <p:par>
+                          <p:cTn fill="hold">
+                            <p:stCondLst>
+                              <p:cond delay="0"/>
+                            </p:stCondLst>
+                            <p:childTnLst>
+                              <p:par>
+                                <p:cTn fill="hold" nodeType="clickEffect" presetClass="entr" presetID="10" presetSubtype="0">
+                                  <p:stCondLst>
+                                    <p:cond delay="0"/>
+                                  </p:stCondLst>
+                                  <p:childTnLst>
+                                    <p:set>
+                                      <p:cBhvr>
+                                        <p:cTn dur="1" fill="hold">
+                                          <p:stCondLst>
+                                            <p:cond delay="0"/>
+                                          </p:stCondLst>
+                                        </p:cTn>
+                                        <p:tgtEl>
                                           <p:spTgt spid="309"/>
                                         </p:tgtEl>
                                         <p:attrNameLst>
@@ -13193,6 +13471,41 @@
                                         </p:tgtEl>
                                       </p:cBhvr>
                                     </p:animEffect>
+                                  </p:childTnLst>
+                                </p:cTn>
+                              </p:par>
+                              <p:par>
+                                <p:cTn fill="hold" nodeType="withEffect" presetClass="exit" presetID="10" presetSubtype="0">
+                                  <p:stCondLst>
+                                    <p:cond delay="0"/>
+                                  </p:stCondLst>
+                                  <p:childTnLst>
+                                    <p:animEffect filter="fade" transition="out">
+                                      <p:cBhvr>
+                                        <p:cTn dur="1000"/>
+                                        <p:tgtEl>
+                                          <p:spTgt spid="308"/>
+                                        </p:tgtEl>
+                                      </p:cBhvr>
+                                    </p:animEffect>
+                                    <p:set>
+                                      <p:cBhvr>
+                                        <p:cTn dur="1" fill="hold">
+                                          <p:stCondLst>
+                                            <p:cond delay="1000"/>
+                                          </p:stCondLst>
+                                        </p:cTn>
+                                        <p:tgtEl>
+                                          <p:spTgt spid="308"/>
+                                        </p:tgtEl>
+                                        <p:attrNameLst>
+                                          <p:attrName>style.visibility</p:attrName>
+                                        </p:attrNameLst>
+                                      </p:cBhvr>
+                                      <p:to>
+                                        <p:strVal val="hidden"/>
+                                      </p:to>
+                                    </p:set>
                                   </p:childTnLst>
                                 </p:cTn>
                               </p:par>
@@ -13316,7 +13629,7 @@
                                           </p:stCondLst>
                                         </p:cTn>
                                         <p:tgtEl>
-                                          <p:spTgt spid="311"/>
+                                          <p:spTgt spid="306"/>
                                         </p:tgtEl>
                                         <p:attrNameLst>
                                           <p:attrName>style.visibility</p:attrName>
@@ -13330,45 +13643,10 @@
                                       <p:cBhvr>
                                         <p:cTn dur="1000"/>
                                         <p:tgtEl>
-                                          <p:spTgt spid="311"/>
+                                          <p:spTgt spid="306"/>
                                         </p:tgtEl>
                                       </p:cBhvr>
                                     </p:animEffect>
-                                  </p:childTnLst>
-                                </p:cTn>
-                              </p:par>
-                              <p:par>
-                                <p:cTn fill="hold" nodeType="withEffect" presetClass="exit" presetID="10" presetSubtype="0">
-                                  <p:stCondLst>
-                                    <p:cond delay="0"/>
-                                  </p:stCondLst>
-                                  <p:childTnLst>
-                                    <p:animEffect filter="fade" transition="out">
-                                      <p:cBhvr>
-                                        <p:cTn dur="1000"/>
-                                        <p:tgtEl>
-                                          <p:spTgt spid="310"/>
-                                        </p:tgtEl>
-                                      </p:cBhvr>
-                                    </p:animEffect>
-                                    <p:set>
-                                      <p:cBhvr>
-                                        <p:cTn dur="1" fill="hold">
-                                          <p:stCondLst>
-                                            <p:cond delay="1000"/>
-                                          </p:stCondLst>
-                                        </p:cTn>
-                                        <p:tgtEl>
-                                          <p:spTgt spid="310"/>
-                                        </p:tgtEl>
-                                        <p:attrNameLst>
-                                          <p:attrName>style.visibility</p:attrName>
-                                        </p:attrNameLst>
-                                      </p:cBhvr>
-                                      <p:to>
-                                        <p:strVal val="hidden"/>
-                                      </p:to>
-                                    </p:set>
                                   </p:childTnLst>
                                 </p:cTn>
                               </p:par>
@@ -13457,7 +13735,7 @@
                                           </p:stCondLst>
                                         </p:cTn>
                                         <p:tgtEl>
-                                          <p:spTgt spid="308"/>
+                                          <p:spTgt spid="311"/>
                                         </p:tgtEl>
                                         <p:attrNameLst>
                                           <p:attrName>style.visibility</p:attrName>
@@ -13471,60 +13749,7 @@
                                       <p:cBhvr>
                                         <p:cTn dur="1000"/>
                                         <p:tgtEl>
-                                          <p:spTgt spid="308"/>
-                                        </p:tgtEl>
-                                      </p:cBhvr>
-                                    </p:animEffect>
-                                  </p:childTnLst>
-                                </p:cTn>
-                              </p:par>
-                            </p:childTnLst>
-                          </p:cTn>
-                        </p:par>
-                      </p:childTnLst>
-                    </p:cTn>
-                  </p:par>
-                  <p:par>
-                    <p:cTn fill="hold">
-                      <p:stCondLst>
-                        <p:cond delay="indefinite"/>
-                      </p:stCondLst>
-                      <p:childTnLst>
-                        <p:par>
-                          <p:cTn fill="hold">
-                            <p:stCondLst>
-                              <p:cond delay="0"/>
-                            </p:stCondLst>
-                            <p:childTnLst>
-                              <p:par>
-                                <p:cTn fill="hold" nodeType="clickEffect" presetClass="entr" presetID="10" presetSubtype="0">
-                                  <p:stCondLst>
-                                    <p:cond delay="0"/>
-                                  </p:stCondLst>
-                                  <p:childTnLst>
-                                    <p:set>
-                                      <p:cBhvr>
-                                        <p:cTn dur="1" fill="hold">
-                                          <p:stCondLst>
-                                            <p:cond delay="0"/>
-                                          </p:stCondLst>
-                                        </p:cTn>
-                                        <p:tgtEl>
-                                          <p:spTgt spid="312"/>
-                                        </p:tgtEl>
-                                        <p:attrNameLst>
-                                          <p:attrName>style.visibility</p:attrName>
-                                        </p:attrNameLst>
-                                      </p:cBhvr>
-                                      <p:to>
-                                        <p:strVal val="visible"/>
-                                      </p:to>
-                                    </p:set>
-                                    <p:animEffect filter="fade" transition="in">
-                                      <p:cBhvr>
-                                        <p:cTn dur="1000"/>
-                                        <p:tgtEl>
-                                          <p:spTgt spid="312"/>
+                                          <p:spTgt spid="311"/>
                                         </p:tgtEl>
                                       </p:cBhvr>
                                     </p:animEffect>
@@ -13567,7 +13792,7 @@
   <p:cSld>
     <p:spTree>
       <p:nvGrpSpPr>
-        <p:cNvPr id="316" name="Shape 316"/>
+        <p:cNvPr id="315" name="Shape 315"/>
         <p:cNvGrpSpPr/>
         <p:nvPr/>
       </p:nvGrpSpPr>
@@ -13581,7 +13806,7 @@
       </p:grpSpPr>
       <p:sp>
         <p:nvSpPr>
-          <p:cNvPr id="317" name="Google Shape;317;p24"/>
+          <p:cNvPr id="316" name="Google Shape;316;p24"/>
           <p:cNvSpPr txBox="1"/>
           <p:nvPr>
             <p:ph type="title"/>
@@ -13621,7 +13846,7 @@
       </p:sp>
       <p:grpSp>
         <p:nvGrpSpPr>
-          <p:cNvPr id="318" name="Google Shape;318;p24"/>
+          <p:cNvPr id="317" name="Google Shape;317;p24"/>
           <p:cNvGrpSpPr/>
           <p:nvPr/>
         </p:nvGrpSpPr>
@@ -13635,7 +13860,7 @@
         </p:grpSpPr>
         <p:pic>
           <p:nvPicPr>
-            <p:cNvPr id="319" name="Google Shape;319;p24"/>
+            <p:cNvPr id="318" name="Google Shape;318;p24"/>
             <p:cNvPicPr preferRelativeResize="0"/>
             <p:nvPr/>
           </p:nvPicPr>
@@ -13663,7 +13888,7 @@
         </p:pic>
         <p:pic>
           <p:nvPicPr>
-            <p:cNvPr id="320" name="Google Shape;320;p24"/>
+            <p:cNvPr id="319" name="Google Shape;319;p24"/>
             <p:cNvPicPr preferRelativeResize="0"/>
             <p:nvPr/>
           </p:nvPicPr>
@@ -13692,7 +13917,7 @@
       </p:grpSp>
       <p:sp>
         <p:nvSpPr>
-          <p:cNvPr id="321" name="Google Shape;321;p24"/>
+          <p:cNvPr id="320" name="Google Shape;320;p24"/>
           <p:cNvSpPr txBox="1"/>
           <p:nvPr>
             <p:ph type="title"/>
@@ -13737,7 +13962,7 @@
       </p:sp>
       <p:sp>
         <p:nvSpPr>
-          <p:cNvPr id="322" name="Google Shape;322;p24"/>
+          <p:cNvPr id="321" name="Google Shape;321;p24"/>
           <p:cNvSpPr txBox="1"/>
           <p:nvPr/>
         </p:nvSpPr>
@@ -13901,7 +14126,7 @@
                                           </p:stCondLst>
                                         </p:cTn>
                                         <p:tgtEl>
-                                          <p:spTgt spid="321"/>
+                                          <p:spTgt spid="320"/>
                                         </p:tgtEl>
                                         <p:attrNameLst>
                                           <p:attrName>style.visibility</p:attrName>
@@ -13915,7 +14140,7 @@
                                       <p:cBhvr>
                                         <p:cTn dur="1000"/>
                                         <p:tgtEl>
-                                          <p:spTgt spid="321"/>
+                                          <p:spTgt spid="320"/>
                                         </p:tgtEl>
                                       </p:cBhvr>
                                     </p:animEffect>
@@ -13936,7 +14161,7 @@
                                           </p:stCondLst>
                                         </p:cTn>
                                         <p:tgtEl>
-                                          <p:spTgt spid="318"/>
+                                          <p:spTgt spid="317"/>
                                         </p:tgtEl>
                                         <p:attrNameLst>
                                           <p:attrName>style.visibility</p:attrName>
@@ -13950,7 +14175,7 @@
                                       <p:cBhvr>
                                         <p:cTn dur="1000"/>
                                         <p:tgtEl>
-                                          <p:spTgt spid="318"/>
+                                          <p:spTgt spid="317"/>
                                         </p:tgtEl>
                                       </p:cBhvr>
                                     </p:animEffect>
@@ -13989,7 +14214,7 @@
                                           </p:stCondLst>
                                         </p:cTn>
                                         <p:tgtEl>
-                                          <p:spTgt spid="322"/>
+                                          <p:spTgt spid="321"/>
                                         </p:tgtEl>
                                         <p:attrNameLst>
                                           <p:attrName>style.visibility</p:attrName>
@@ -14003,7 +14228,7 @@
                                       <p:cBhvr>
                                         <p:cTn dur="1000"/>
                                         <p:tgtEl>
-                                          <p:spTgt spid="322"/>
+                                          <p:spTgt spid="321"/>
                                         </p:tgtEl>
                                       </p:cBhvr>
                                     </p:animEffect>
@@ -14046,7 +14271,7 @@
   <p:cSld>
     <p:spTree>
       <p:nvGrpSpPr>
-        <p:cNvPr id="326" name="Shape 326"/>
+        <p:cNvPr id="325" name="Shape 325"/>
         <p:cNvGrpSpPr/>
         <p:nvPr/>
       </p:nvGrpSpPr>
@@ -14060,7 +14285,7 @@
       </p:grpSpPr>
       <p:pic>
         <p:nvPicPr>
-          <p:cNvPr id="327" name="Google Shape;327;p25"/>
+          <p:cNvPr id="326" name="Google Shape;326;p25"/>
           <p:cNvPicPr preferRelativeResize="0"/>
           <p:nvPr/>
         </p:nvPicPr>
@@ -14088,7 +14313,7 @@
       </p:pic>
       <p:sp>
         <p:nvSpPr>
-          <p:cNvPr id="328" name="Google Shape;328;p25"/>
+          <p:cNvPr id="327" name="Google Shape;327;p25"/>
           <p:cNvSpPr txBox="1"/>
           <p:nvPr>
             <p:ph type="title"/>
@@ -14128,7 +14353,7 @@
       </p:sp>
       <p:grpSp>
         <p:nvGrpSpPr>
-          <p:cNvPr id="329" name="Google Shape;329;p25"/>
+          <p:cNvPr id="328" name="Google Shape;328;p25"/>
           <p:cNvGrpSpPr/>
           <p:nvPr/>
         </p:nvGrpSpPr>
@@ -14142,7 +14367,7 @@
         </p:grpSpPr>
         <p:sp>
           <p:nvSpPr>
-            <p:cNvPr id="330" name="Google Shape;330;p25"/>
+            <p:cNvPr id="329" name="Google Shape;329;p25"/>
             <p:cNvSpPr/>
             <p:nvPr/>
           </p:nvSpPr>
@@ -14189,7 +14414,7 @@
         </p:sp>
         <p:sp>
           <p:nvSpPr>
-            <p:cNvPr id="331" name="Google Shape;331;p25"/>
+            <p:cNvPr id="330" name="Google Shape;330;p25"/>
             <p:cNvSpPr/>
             <p:nvPr/>
           </p:nvSpPr>
@@ -14236,7 +14461,7 @@
         </p:sp>
         <p:sp>
           <p:nvSpPr>
-            <p:cNvPr id="332" name="Google Shape;332;p25"/>
+            <p:cNvPr id="331" name="Google Shape;331;p25"/>
             <p:cNvSpPr/>
             <p:nvPr/>
           </p:nvSpPr>
@@ -14283,7 +14508,7 @@
         </p:sp>
         <p:sp>
           <p:nvSpPr>
-            <p:cNvPr id="333" name="Google Shape;333;p25"/>
+            <p:cNvPr id="332" name="Google Shape;332;p25"/>
             <p:cNvSpPr/>
             <p:nvPr/>
           </p:nvSpPr>
@@ -14331,7 +14556,7 @@
       </p:grpSp>
       <p:grpSp>
         <p:nvGrpSpPr>
-          <p:cNvPr id="334" name="Google Shape;334;p25"/>
+          <p:cNvPr id="333" name="Google Shape;333;p25"/>
           <p:cNvGrpSpPr/>
           <p:nvPr/>
         </p:nvGrpSpPr>
@@ -14345,7 +14570,7 @@
         </p:grpSpPr>
         <p:sp>
           <p:nvSpPr>
-            <p:cNvPr id="335" name="Google Shape;335;p25"/>
+            <p:cNvPr id="334" name="Google Shape;334;p25"/>
             <p:cNvSpPr/>
             <p:nvPr/>
           </p:nvSpPr>
@@ -14396,7 +14621,7 @@
         </p:sp>
         <p:sp>
           <p:nvSpPr>
-            <p:cNvPr id="336" name="Google Shape;336;p25"/>
+            <p:cNvPr id="335" name="Google Shape;335;p25"/>
             <p:cNvSpPr/>
             <p:nvPr/>
           </p:nvSpPr>
@@ -14447,7 +14672,7 @@
         </p:sp>
         <p:sp>
           <p:nvSpPr>
-            <p:cNvPr id="337" name="Google Shape;337;p25"/>
+            <p:cNvPr id="336" name="Google Shape;336;p25"/>
             <p:cNvSpPr/>
             <p:nvPr/>
           </p:nvSpPr>
@@ -14498,7 +14723,7 @@
         </p:sp>
         <p:sp>
           <p:nvSpPr>
-            <p:cNvPr id="338" name="Google Shape;338;p25"/>
+            <p:cNvPr id="337" name="Google Shape;337;p25"/>
             <p:cNvSpPr/>
             <p:nvPr/>
           </p:nvSpPr>
@@ -14587,7 +14812,7 @@
                                           </p:stCondLst>
                                         </p:cTn>
                                         <p:tgtEl>
-                                          <p:spTgt spid="329"/>
+                                          <p:spTgt spid="328"/>
                                         </p:tgtEl>
                                         <p:attrNameLst>
                                           <p:attrName>style.visibility</p:attrName>
@@ -14601,7 +14826,7 @@
                                       <p:cBhvr>
                                         <p:cTn dur="1000"/>
                                         <p:tgtEl>
-                                          <p:spTgt spid="329"/>
+                                          <p:spTgt spid="328"/>
                                         </p:tgtEl>
                                       </p:cBhvr>
                                     </p:animEffect>
@@ -14640,7 +14865,7 @@
                                           </p:stCondLst>
                                         </p:cTn>
                                         <p:tgtEl>
-                                          <p:spTgt spid="334"/>
+                                          <p:spTgt spid="333"/>
                                         </p:tgtEl>
                                         <p:attrNameLst>
                                           <p:attrName>style.visibility</p:attrName>
@@ -14654,7 +14879,7 @@
                                       <p:cBhvr>
                                         <p:cTn dur="1000"/>
                                         <p:tgtEl>
-                                          <p:spTgt spid="334"/>
+                                          <p:spTgt spid="333"/>
                                         </p:tgtEl>
                                       </p:cBhvr>
                                     </p:animEffect>
@@ -14697,7 +14922,7 @@
   <p:cSld>
     <p:spTree>
       <p:nvGrpSpPr>
-        <p:cNvPr id="342" name="Shape 342"/>
+        <p:cNvPr id="341" name="Shape 341"/>
         <p:cNvGrpSpPr/>
         <p:nvPr/>
       </p:nvGrpSpPr>
@@ -14711,7 +14936,7 @@
       </p:grpSpPr>
       <p:pic>
         <p:nvPicPr>
-          <p:cNvPr id="343" name="Google Shape;343;p26"/>
+          <p:cNvPr id="342" name="Google Shape;342;p26"/>
           <p:cNvPicPr preferRelativeResize="0"/>
           <p:nvPr/>
         </p:nvPicPr>
@@ -14739,7 +14964,7 @@
       </p:pic>
       <p:sp>
         <p:nvSpPr>
-          <p:cNvPr id="344" name="Google Shape;344;p26"/>
+          <p:cNvPr id="343" name="Google Shape;343;p26"/>
           <p:cNvSpPr txBox="1"/>
           <p:nvPr/>
         </p:nvSpPr>
@@ -14809,7 +15034,7 @@
       </p:sp>
       <p:sp>
         <p:nvSpPr>
-          <p:cNvPr id="345" name="Google Shape;345;p26"/>
+          <p:cNvPr id="344" name="Google Shape;344;p26"/>
           <p:cNvSpPr txBox="1"/>
           <p:nvPr/>
         </p:nvSpPr>
@@ -14879,7 +15104,7 @@
       </p:sp>
       <p:cxnSp>
         <p:nvCxnSpPr>
-          <p:cNvPr id="346" name="Google Shape;346;p26"/>
+          <p:cNvPr id="345" name="Google Shape;345;p26"/>
           <p:cNvCxnSpPr/>
           <p:nvPr/>
         </p:nvCxnSpPr>
@@ -14905,13 +15130,13 @@
       </p:cxnSp>
       <p:sp>
         <p:nvSpPr>
-          <p:cNvPr id="347" name="Google Shape;347;p26"/>
+          <p:cNvPr id="346" name="Google Shape;346;p26"/>
           <p:cNvSpPr txBox="1"/>
           <p:nvPr/>
         </p:nvSpPr>
         <p:spPr>
           <a:xfrm>
-            <a:off x="6563400" y="3145925"/>
+            <a:off x="6552475" y="3051450"/>
             <a:ext cx="2277600" cy="615600"/>
           </a:xfrm>
           <a:prstGeom prst="rect">
@@ -15015,7 +15240,7 @@
                                           </p:stCondLst>
                                         </p:cTn>
                                         <p:tgtEl>
-                                          <p:spTgt spid="345"/>
+                                          <p:spTgt spid="344"/>
                                         </p:tgtEl>
                                         <p:attrNameLst>
                                           <p:attrName>style.visibility</p:attrName>
@@ -15029,7 +15254,7 @@
                                       <p:cBhvr>
                                         <p:cTn dur="1000"/>
                                         <p:tgtEl>
-                                          <p:spTgt spid="345"/>
+                                          <p:spTgt spid="344"/>
                                         </p:tgtEl>
                                       </p:cBhvr>
                                     </p:animEffect>
@@ -15068,7 +15293,7 @@
                                           </p:stCondLst>
                                         </p:cTn>
                                         <p:tgtEl>
-                                          <p:spTgt spid="346"/>
+                                          <p:spTgt spid="345"/>
                                         </p:tgtEl>
                                         <p:attrNameLst>
                                           <p:attrName>style.visibility</p:attrName>
@@ -15082,7 +15307,7 @@
                                       <p:cBhvr>
                                         <p:cTn dur="1000"/>
                                         <p:tgtEl>
-                                          <p:spTgt spid="346"/>
+                                          <p:spTgt spid="345"/>
                                         </p:tgtEl>
                                       </p:cBhvr>
                                     </p:animEffect>
@@ -15112,7 +15337,7 @@
                                           </p:stCondLst>
                                         </p:cTn>
                                         <p:tgtEl>
-                                          <p:spTgt spid="347"/>
+                                          <p:spTgt spid="346"/>
                                         </p:tgtEl>
                                         <p:attrNameLst>
                                           <p:attrName>style.visibility</p:attrName>
@@ -15126,7 +15351,7 @@
                                       <p:cBhvr>
                                         <p:cTn dur="1000"/>
                                         <p:tgtEl>
-                                          <p:spTgt spid="347"/>
+                                          <p:spTgt spid="346"/>
                                         </p:tgtEl>
                                       </p:cBhvr>
                                     </p:animEffect>
@@ -15169,7 +15394,298 @@
   <p:cSld>
     <p:spTree>
       <p:nvGrpSpPr>
-        <p:cNvPr id="351" name="Shape 351"/>
+        <p:cNvPr id="350" name="Shape 350"/>
+        <p:cNvGrpSpPr/>
+        <p:nvPr/>
+      </p:nvGrpSpPr>
+      <p:grpSpPr>
+        <a:xfrm>
+          <a:off x="0" y="0"/>
+          <a:ext cx="0" cy="0"/>
+          <a:chOff x="0" y="0"/>
+          <a:chExt cx="0" cy="0"/>
+        </a:xfrm>
+      </p:grpSpPr>
+      <p:pic>
+        <p:nvPicPr>
+          <p:cNvPr id="351" name="Google Shape;351;p27"/>
+          <p:cNvPicPr preferRelativeResize="0"/>
+          <p:nvPr/>
+        </p:nvPicPr>
+        <p:blipFill>
+          <a:blip r:embed="rId3">
+            <a:alphaModFix/>
+          </a:blip>
+          <a:stretch>
+            <a:fillRect/>
+          </a:stretch>
+        </p:blipFill>
+        <p:spPr>
+          <a:xfrm>
+            <a:off x="152400" y="152400"/>
+            <a:ext cx="8783024" cy="4794001"/>
+          </a:xfrm>
+          <a:prstGeom prst="rect">
+            <a:avLst/>
+          </a:prstGeom>
+          <a:noFill/>
+          <a:ln>
+            <a:noFill/>
+          </a:ln>
+        </p:spPr>
+      </p:pic>
+      <p:grpSp>
+        <p:nvGrpSpPr>
+          <p:cNvPr id="352" name="Google Shape;352;p27"/>
+          <p:cNvGrpSpPr/>
+          <p:nvPr/>
+        </p:nvGrpSpPr>
+        <p:grpSpPr>
+          <a:xfrm>
+            <a:off x="6691350" y="1519975"/>
+            <a:ext cx="2124950" cy="2213375"/>
+            <a:chOff x="6691350" y="1519975"/>
+            <a:chExt cx="2124950" cy="2213375"/>
+          </a:xfrm>
+        </p:grpSpPr>
+        <p:sp>
+          <p:nvSpPr>
+            <p:cNvPr id="353" name="Google Shape;353;p27"/>
+            <p:cNvSpPr txBox="1"/>
+            <p:nvPr/>
+          </p:nvSpPr>
+          <p:spPr>
+            <a:xfrm>
+              <a:off x="6691350" y="3333150"/>
+              <a:ext cx="1984200" cy="400200"/>
+            </a:xfrm>
+            <a:prstGeom prst="rect">
+              <a:avLst/>
+            </a:prstGeom>
+            <a:noFill/>
+            <a:ln>
+              <a:noFill/>
+            </a:ln>
+          </p:spPr>
+          <p:txBody>
+            <a:bodyPr anchorCtr="0" anchor="t" bIns="91425" lIns="91425" spcFirstLastPara="1" rIns="91425" wrap="square" tIns="91425">
+              <a:spAutoFit/>
+            </a:bodyPr>
+            <a:lstStyle/>
+            <a:p>
+              <a:pPr indent="0" lvl="0" marL="0" rtl="0" algn="l">
+                <a:spcBef>
+                  <a:spcPts val="0"/>
+                </a:spcBef>
+                <a:spcAft>
+                  <a:spcPts val="0"/>
+                </a:spcAft>
+                <a:buNone/>
+              </a:pPr>
+              <a:r>
+                <a:rPr b="1" lang="en">
+                  <a:solidFill>
+                    <a:srgbClr val="FF9900"/>
+                  </a:solidFill>
+                  <a:latin typeface="Calibri"/>
+                  <a:ea typeface="Calibri"/>
+                  <a:cs typeface="Calibri"/>
+                  <a:sym typeface="Calibri"/>
+                </a:rPr>
+                <a:t>VIX up 15% 4/11/2022</a:t>
+              </a:r>
+              <a:endParaRPr b="1">
+                <a:solidFill>
+                  <a:srgbClr val="FF9900"/>
+                </a:solidFill>
+                <a:latin typeface="Calibri"/>
+                <a:ea typeface="Calibri"/>
+                <a:cs typeface="Calibri"/>
+                <a:sym typeface="Calibri"/>
+              </a:endParaRPr>
+            </a:p>
+          </p:txBody>
+        </p:sp>
+        <p:sp>
+          <p:nvSpPr>
+            <p:cNvPr id="354" name="Google Shape;354;p27"/>
+            <p:cNvSpPr txBox="1"/>
+            <p:nvPr/>
+          </p:nvSpPr>
+          <p:spPr>
+            <a:xfrm>
+              <a:off x="6832100" y="1519975"/>
+              <a:ext cx="1984200" cy="400200"/>
+            </a:xfrm>
+            <a:prstGeom prst="rect">
+              <a:avLst/>
+            </a:prstGeom>
+            <a:noFill/>
+            <a:ln>
+              <a:noFill/>
+            </a:ln>
+          </p:spPr>
+          <p:txBody>
+            <a:bodyPr anchorCtr="0" anchor="t" bIns="91425" lIns="91425" spcFirstLastPara="1" rIns="91425" wrap="square" tIns="91425">
+              <a:spAutoFit/>
+            </a:bodyPr>
+            <a:lstStyle/>
+            <a:p>
+              <a:pPr indent="0" lvl="0" marL="0" rtl="0" algn="l">
+                <a:spcBef>
+                  <a:spcPts val="0"/>
+                </a:spcBef>
+                <a:spcAft>
+                  <a:spcPts val="0"/>
+                </a:spcAft>
+                <a:buNone/>
+              </a:pPr>
+              <a:r>
+                <a:rPr b="1" lang="en">
+                  <a:solidFill>
+                    <a:srgbClr val="4A86E8"/>
+                  </a:solidFill>
+                  <a:latin typeface="Calibri"/>
+                  <a:ea typeface="Calibri"/>
+                  <a:cs typeface="Calibri"/>
+                  <a:sym typeface="Calibri"/>
+                </a:rPr>
+                <a:t>S&amp;P</a:t>
+              </a:r>
+              <a:r>
+                <a:rPr lang="en">
+                  <a:solidFill>
+                    <a:srgbClr val="FF9900"/>
+                  </a:solidFill>
+                  <a:latin typeface="Calibri"/>
+                  <a:ea typeface="Calibri"/>
+                  <a:cs typeface="Calibri"/>
+                  <a:sym typeface="Calibri"/>
+                </a:rPr>
+                <a:t> </a:t>
+              </a:r>
+              <a:r>
+                <a:rPr b="1" lang="en">
+                  <a:solidFill>
+                    <a:schemeClr val="accent2"/>
+                  </a:solidFill>
+                  <a:latin typeface="Calibri"/>
+                  <a:ea typeface="Calibri"/>
+                  <a:cs typeface="Calibri"/>
+                  <a:sym typeface="Calibri"/>
+                </a:rPr>
+                <a:t>-1.64%</a:t>
+              </a:r>
+              <a:endParaRPr b="1">
+                <a:solidFill>
+                  <a:schemeClr val="accent2"/>
+                </a:solidFill>
+                <a:latin typeface="Calibri"/>
+                <a:ea typeface="Calibri"/>
+                <a:cs typeface="Calibri"/>
+                <a:sym typeface="Calibri"/>
+              </a:endParaRPr>
+            </a:p>
+          </p:txBody>
+        </p:sp>
+      </p:grpSp>
+    </p:spTree>
+  </p:cSld>
+  <p:clrMapOvr>
+    <a:masterClrMapping/>
+  </p:clrMapOvr>
+  <p:timing>
+    <p:tnLst>
+      <p:par>
+        <p:cTn dur="indefinite" nodeType="tmRoot" restart="never">
+          <p:childTnLst>
+            <p:seq concurrent="1" nextAc="seek">
+              <p:cTn dur="indefinite" id="2" nodeType="mainSeq">
+                <p:childTnLst>
+                  <p:par>
+                    <p:cTn fill="hold">
+                      <p:stCondLst>
+                        <p:cond delay="indefinite"/>
+                      </p:stCondLst>
+                      <p:childTnLst>
+                        <p:par>
+                          <p:cTn fill="hold">
+                            <p:stCondLst>
+                              <p:cond delay="0"/>
+                            </p:stCondLst>
+                            <p:childTnLst>
+                              <p:par>
+                                <p:cTn fill="hold" nodeType="clickEffect" presetClass="entr" presetID="10" presetSubtype="0">
+                                  <p:stCondLst>
+                                    <p:cond delay="0"/>
+                                  </p:stCondLst>
+                                  <p:childTnLst>
+                                    <p:set>
+                                      <p:cBhvr>
+                                        <p:cTn dur="1" fill="hold">
+                                          <p:stCondLst>
+                                            <p:cond delay="0"/>
+                                          </p:stCondLst>
+                                        </p:cTn>
+                                        <p:tgtEl>
+                                          <p:spTgt spid="352"/>
+                                        </p:tgtEl>
+                                        <p:attrNameLst>
+                                          <p:attrName>style.visibility</p:attrName>
+                                        </p:attrNameLst>
+                                      </p:cBhvr>
+                                      <p:to>
+                                        <p:strVal val="visible"/>
+                                      </p:to>
+                                    </p:set>
+                                    <p:animEffect filter="fade" transition="in">
+                                      <p:cBhvr>
+                                        <p:cTn dur="1000"/>
+                                        <p:tgtEl>
+                                          <p:spTgt spid="352"/>
+                                        </p:tgtEl>
+                                      </p:cBhvr>
+                                    </p:animEffect>
+                                  </p:childTnLst>
+                                </p:cTn>
+                              </p:par>
+                            </p:childTnLst>
+                          </p:cTn>
+                        </p:par>
+                      </p:childTnLst>
+                    </p:cTn>
+                  </p:par>
+                </p:childTnLst>
+              </p:cTn>
+              <p:prevCondLst>
+                <p:cond evt="onPrev">
+                  <p:tgtEl>
+                    <p:sldTgt/>
+                  </p:tgtEl>
+                </p:cond>
+              </p:prevCondLst>
+              <p:nextCondLst>
+                <p:cond evt="onNext">
+                  <p:tgtEl>
+                    <p:sldTgt/>
+                  </p:tgtEl>
+                </p:cond>
+              </p:nextCondLst>
+            </p:seq>
+          </p:childTnLst>
+        </p:cTn>
+      </p:par>
+    </p:tnLst>
+  </p:timing>
+</p:sld>
+</file>
+
+<file path=ppt/slides/slide16.xml><?xml version="1.0" encoding="utf-8"?>
+<p:sld xmlns:a="http://schemas.openxmlformats.org/drawingml/2006/main" xmlns:r="http://schemas.openxmlformats.org/officeDocument/2006/relationships" xmlns:mc="http://schemas.openxmlformats.org/markup-compatibility/2006" xmlns:mv="urn:schemas-microsoft-com:mac:vml" xmlns:p="http://schemas.openxmlformats.org/presentationml/2006/main" xmlns:c="http://schemas.openxmlformats.org/drawingml/2006/chart" xmlns:dgm="http://schemas.openxmlformats.org/drawingml/2006/diagram" xmlns:o="urn:schemas-microsoft-com:office:office" xmlns:v="urn:schemas-microsoft-com:vml" xmlns:pvml="urn:schemas-microsoft-com:office:powerpoint" xmlns:com="http://schemas.openxmlformats.org/drawingml/2006/compatibility" xmlns:p14="http://schemas.microsoft.com/office/powerpoint/2010/main" xmlns:p15="http://schemas.microsoft.com/office/powerpoint/2012/main" xmlns:ahyp="http://schemas.microsoft.com/office/drawing/2018/hyperlinkcolor">
+  <p:cSld>
+    <p:spTree>
+      <p:nvGrpSpPr>
+        <p:cNvPr id="358" name="Shape 358"/>
         <p:cNvGrpSpPr/>
         <p:nvPr/>
       </p:nvGrpSpPr>
@@ -15183,7 +15699,7 @@
       </p:grpSpPr>
       <p:sp>
         <p:nvSpPr>
-          <p:cNvPr id="352" name="Google Shape;352;p27"/>
+          <p:cNvPr id="359" name="Google Shape;359;p28"/>
           <p:cNvSpPr txBox="1"/>
           <p:nvPr>
             <p:ph type="ctrTitle"/>
@@ -23030,34 +23546,6 @@
         </p:blipFill>
         <p:spPr>
           <a:xfrm>
-            <a:off x="783875" y="681675"/>
-            <a:ext cx="7014400" cy="4419600"/>
-          </a:xfrm>
-          <a:prstGeom prst="rect">
-            <a:avLst/>
-          </a:prstGeom>
-          <a:noFill/>
-          <a:ln>
-            <a:noFill/>
-          </a:ln>
-        </p:spPr>
-      </p:pic>
-      <p:pic>
-        <p:nvPicPr>
-          <p:cNvPr id="270" name="Google Shape;270;p21"/>
-          <p:cNvPicPr preferRelativeResize="0"/>
-          <p:nvPr/>
-        </p:nvPicPr>
-        <p:blipFill>
-          <a:blip r:embed="rId4">
-            <a:alphaModFix/>
-          </a:blip>
-          <a:stretch>
-            <a:fillRect/>
-          </a:stretch>
-        </p:blipFill>
-        <p:spPr>
-          <a:xfrm>
             <a:off x="745675" y="460750"/>
             <a:ext cx="6958549" cy="4447675"/>
           </a:xfrm>
@@ -23072,7 +23560,7 @@
       </p:pic>
       <p:sp>
         <p:nvSpPr>
-          <p:cNvPr id="271" name="Google Shape;271;p21"/>
+          <p:cNvPr id="270" name="Google Shape;270;p21"/>
           <p:cNvSpPr txBox="1"/>
           <p:nvPr>
             <p:ph type="title"/>
@@ -23112,7 +23600,7 @@
       </p:sp>
       <p:grpSp>
         <p:nvGrpSpPr>
-          <p:cNvPr id="272" name="Google Shape;272;p21"/>
+          <p:cNvPr id="271" name="Google Shape;271;p21"/>
           <p:cNvGrpSpPr/>
           <p:nvPr/>
         </p:nvGrpSpPr>
@@ -23126,7 +23614,7 @@
         </p:grpSpPr>
         <p:sp>
           <p:nvSpPr>
-            <p:cNvPr id="273" name="Google Shape;273;p21"/>
+            <p:cNvPr id="272" name="Google Shape;272;p21"/>
             <p:cNvSpPr/>
             <p:nvPr/>
           </p:nvSpPr>
@@ -23173,7 +23661,7 @@
         </p:sp>
         <p:sp>
           <p:nvSpPr>
-            <p:cNvPr id="274" name="Google Shape;274;p21"/>
+            <p:cNvPr id="273" name="Google Shape;273;p21"/>
             <p:cNvSpPr/>
             <p:nvPr/>
           </p:nvSpPr>
@@ -23221,7 +23709,7 @@
       </p:grpSp>
       <p:sp>
         <p:nvSpPr>
-          <p:cNvPr id="275" name="Google Shape;275;p21"/>
+          <p:cNvPr id="274" name="Google Shape;274;p21"/>
           <p:cNvSpPr/>
           <p:nvPr/>
         </p:nvSpPr>
@@ -23270,7 +23758,7 @@
       </p:sp>
       <p:sp>
         <p:nvSpPr>
-          <p:cNvPr id="276" name="Google Shape;276;p21"/>
+          <p:cNvPr id="275" name="Google Shape;275;p21"/>
           <p:cNvSpPr/>
           <p:nvPr/>
         </p:nvSpPr>
@@ -23319,7 +23807,7 @@
       </p:sp>
       <p:sp>
         <p:nvSpPr>
-          <p:cNvPr id="277" name="Google Shape;277;p21"/>
+          <p:cNvPr id="276" name="Google Shape;276;p21"/>
           <p:cNvSpPr txBox="1"/>
           <p:nvPr/>
         </p:nvSpPr>
@@ -23417,7 +23905,7 @@
                                           </p:stCondLst>
                                         </p:cTn>
                                         <p:tgtEl>
-                                          <p:spTgt spid="270"/>
+                                          <p:spTgt spid="269"/>
                                         </p:tgtEl>
                                         <p:attrNameLst>
                                           <p:attrName>style.visibility</p:attrName>
@@ -23431,7 +23919,7 @@
                                       <p:cBhvr>
                                         <p:cTn dur="3500"/>
                                         <p:tgtEl>
-                                          <p:spTgt spid="270"/>
+                                          <p:spTgt spid="269"/>
                                         </p:tgtEl>
                                       </p:cBhvr>
                                     </p:animEffect>
@@ -23470,7 +23958,7 @@
                                           </p:stCondLst>
                                         </p:cTn>
                                         <p:tgtEl>
-                                          <p:spTgt spid="272"/>
+                                          <p:spTgt spid="271"/>
                                         </p:tgtEl>
                                         <p:attrNameLst>
                                           <p:attrName>style.visibility</p:attrName>
@@ -23484,139 +23972,7 @@
                                       <p:cBhvr>
                                         <p:cTn dur="1000"/>
                                         <p:tgtEl>
-                                          <p:spTgt spid="272"/>
-                                        </p:tgtEl>
-                                      </p:cBhvr>
-                                    </p:animEffect>
-                                  </p:childTnLst>
-                                </p:cTn>
-                              </p:par>
-                            </p:childTnLst>
-                          </p:cTn>
-                        </p:par>
-                      </p:childTnLst>
-                    </p:cTn>
-                  </p:par>
-                  <p:par>
-                    <p:cTn fill="hold">
-                      <p:stCondLst>
-                        <p:cond delay="indefinite"/>
-                      </p:stCondLst>
-                      <p:childTnLst>
-                        <p:par>
-                          <p:cTn fill="hold">
-                            <p:stCondLst>
-                              <p:cond delay="0"/>
-                            </p:stCondLst>
-                            <p:childTnLst>
-                              <p:par>
-                                <p:cTn fill="hold" nodeType="clickEffect" presetClass="exit" presetID="10" presetSubtype="0">
-                                  <p:stCondLst>
-                                    <p:cond delay="0"/>
-                                  </p:stCondLst>
-                                  <p:childTnLst>
-                                    <p:animEffect filter="fade" transition="out">
-                                      <p:cBhvr>
-                                        <p:cTn dur="1000"/>
-                                        <p:tgtEl>
-                                          <p:spTgt spid="270"/>
-                                        </p:tgtEl>
-                                      </p:cBhvr>
-                                    </p:animEffect>
-                                    <p:set>
-                                      <p:cBhvr>
-                                        <p:cTn dur="1" fill="hold">
-                                          <p:stCondLst>
-                                            <p:cond delay="1000"/>
-                                          </p:stCondLst>
-                                        </p:cTn>
-                                        <p:tgtEl>
-                                          <p:spTgt spid="270"/>
-                                        </p:tgtEl>
-                                        <p:attrNameLst>
-                                          <p:attrName>style.visibility</p:attrName>
-                                        </p:attrNameLst>
-                                      </p:cBhvr>
-                                      <p:to>
-                                        <p:strVal val="hidden"/>
-                                      </p:to>
-                                    </p:set>
-                                  </p:childTnLst>
-                                </p:cTn>
-                              </p:par>
-                              <p:par>
-                                <p:cTn fill="hold" nodeType="withEffect" presetClass="exit" presetID="10" presetSubtype="0">
-                                  <p:stCondLst>
-                                    <p:cond delay="0"/>
-                                  </p:stCondLst>
-                                  <p:childTnLst>
-                                    <p:animEffect filter="fade" transition="out">
-                                      <p:cBhvr>
-                                        <p:cTn dur="1000"/>
-                                        <p:tgtEl>
-                                          <p:spTgt spid="272"/>
-                                        </p:tgtEl>
-                                      </p:cBhvr>
-                                    </p:animEffect>
-                                    <p:set>
-                                      <p:cBhvr>
-                                        <p:cTn dur="1" fill="hold">
-                                          <p:stCondLst>
-                                            <p:cond delay="1000"/>
-                                          </p:stCondLst>
-                                        </p:cTn>
-                                        <p:tgtEl>
-                                          <p:spTgt spid="272"/>
-                                        </p:tgtEl>
-                                        <p:attrNameLst>
-                                          <p:attrName>style.visibility</p:attrName>
-                                        </p:attrNameLst>
-                                      </p:cBhvr>
-                                      <p:to>
-                                        <p:strVal val="hidden"/>
-                                      </p:to>
-                                    </p:set>
-                                  </p:childTnLst>
-                                </p:cTn>
-                              </p:par>
-                            </p:childTnLst>
-                          </p:cTn>
-                        </p:par>
-                        <p:par>
-                          <p:cTn fill="hold">
-                            <p:stCondLst>
-                              <p:cond delay="1000"/>
-                            </p:stCondLst>
-                            <p:childTnLst>
-                              <p:par>
-                                <p:cTn fill="hold" nodeType="afterEffect" presetClass="entr" presetID="10" presetSubtype="0">
-                                  <p:stCondLst>
-                                    <p:cond delay="0"/>
-                                  </p:stCondLst>
-                                  <p:childTnLst>
-                                    <p:set>
-                                      <p:cBhvr>
-                                        <p:cTn dur="1" fill="hold">
-                                          <p:stCondLst>
-                                            <p:cond delay="0"/>
-                                          </p:stCondLst>
-                                        </p:cTn>
-                                        <p:tgtEl>
-                                          <p:spTgt spid="269"/>
-                                        </p:tgtEl>
-                                        <p:attrNameLst>
-                                          <p:attrName>style.visibility</p:attrName>
-                                        </p:attrNameLst>
-                                      </p:cBhvr>
-                                      <p:to>
-                                        <p:strVal val="visible"/>
-                                      </p:to>
-                                    </p:set>
-                                    <p:animEffect filter="fade" transition="in">
-                                      <p:cBhvr>
-                                        <p:cTn dur="1000"/>
-                                        <p:tgtEl>
-                                          <p:spTgt spid="269"/>
+                                          <p:spTgt spid="271"/>
                                         </p:tgtEl>
                                       </p:cBhvr>
                                     </p:animEffect>
@@ -23655,6 +24011,285 @@
 </file>
 
 <file path=ppt/theme/theme1.xml><?xml version="1.0" encoding="utf-8"?>
+<a:theme xmlns:a="http://schemas.openxmlformats.org/drawingml/2006/main" xmlns:r="http://schemas.openxmlformats.org/officeDocument/2006/relationships">
+  <a:themeElements>
+    <a:clrScheme name="Default">
+      <a:dk1>
+        <a:srgbClr val="000000"/>
+      </a:dk1>
+      <a:lt1>
+        <a:srgbClr val="FFFFFF"/>
+      </a:lt1>
+      <a:dk2>
+        <a:srgbClr val="158158"/>
+      </a:dk2>
+      <a:lt2>
+        <a:srgbClr val="F3F3F3"/>
+      </a:lt2>
+      <a:accent1>
+        <a:srgbClr val="058DC7"/>
+      </a:accent1>
+      <a:accent2>
+        <a:srgbClr val="50B432"/>
+      </a:accent2>
+      <a:accent3>
+        <a:srgbClr val="ED561B"/>
+      </a:accent3>
+      <a:accent4>
+        <a:srgbClr val="EDEF00"/>
+      </a:accent4>
+      <a:accent5>
+        <a:srgbClr val="24CBE5"/>
+      </a:accent5>
+      <a:accent6>
+        <a:srgbClr val="64E572"/>
+      </a:accent6>
+      <a:hlink>
+        <a:srgbClr val="2200CC"/>
+      </a:hlink>
+      <a:folHlink>
+        <a:srgbClr val="551A8B"/>
+      </a:folHlink>
+    </a:clrScheme>
+    <a:fontScheme name="Office">
+      <a:majorFont>
+        <a:latin typeface="Arial"/>
+        <a:ea typeface=""/>
+        <a:cs typeface=""/>
+        <a:font script="Jpan" typeface="ＭＳ Ｐゴシック"/>
+        <a:font script="Hang" typeface="맑은 고딕"/>
+        <a:font script="Hans" typeface="宋体"/>
+        <a:font script="Hant" typeface="新細明體"/>
+        <a:font script="Arab" typeface="Times New Roman"/>
+        <a:font script="Hebr" typeface="Times New Roman"/>
+        <a:font script="Thai" typeface="Angsana New"/>
+        <a:font script="Ethi" typeface="Nyala"/>
+        <a:font script="Beng" typeface="Vrinda"/>
+        <a:font script="Gujr" typeface="Shruti"/>
+        <a:font script="Khmr" typeface="MoolBoran"/>
+        <a:font script="Knda" typeface="Tunga"/>
+        <a:font script="Guru" typeface="Raavi"/>
+        <a:font script="Cans" typeface="Euphemia"/>
+        <a:font script="Cher" typeface="Plantagenet Cherokee"/>
+        <a:font script="Yiii" typeface="Microsoft Yi Baiti"/>
+        <a:font script="Tibt" typeface="Microsoft Himalaya"/>
+        <a:font script="Thaa" typeface="MV Boli"/>
+        <a:font script="Deva" typeface="Mangal"/>
+        <a:font script="Telu" typeface="Gautami"/>
+        <a:font script="Taml" typeface="Latha"/>
+        <a:font script="Syrc" typeface="Estrangelo Edessa"/>
+        <a:font script="Orya" typeface="Kalinga"/>
+        <a:font script="Mlym" typeface="Kartika"/>
+        <a:font script="Laoo" typeface="DokChampa"/>
+        <a:font script="Sinh" typeface="Iskoola Pota"/>
+        <a:font script="Mong" typeface="Mongolian Baiti"/>
+        <a:font script="Viet" typeface="Times New Roman"/>
+        <a:font script="Uigh" typeface="Microsoft Uighur"/>
+        <a:font script="Geor" typeface="Sylfaen"/>
+      </a:majorFont>
+      <a:minorFont>
+        <a:latin typeface="Arial"/>
+        <a:ea typeface=""/>
+        <a:cs typeface=""/>
+        <a:font script="Jpan" typeface="ＭＳ Ｐゴシック"/>
+        <a:font script="Hang" typeface="맑은 고딕"/>
+        <a:font script="Hans" typeface="宋体"/>
+        <a:font script="Hant" typeface="新細明體"/>
+        <a:font script="Arab" typeface="Arial"/>
+        <a:font script="Hebr" typeface="Arial"/>
+        <a:font script="Thai" typeface="Cordia New"/>
+        <a:font script="Ethi" typeface="Nyala"/>
+        <a:font script="Beng" typeface="Vrinda"/>
+        <a:font script="Gujr" typeface="Shruti"/>
+        <a:font script="Khmr" typeface="DaunPenh"/>
+        <a:font script="Knda" typeface="Tunga"/>
+        <a:font script="Guru" typeface="Raavi"/>
+        <a:font script="Cans" typeface="Euphemia"/>
+        <a:font script="Cher" typeface="Plantagenet Cherokee"/>
+        <a:font script="Yiii" typeface="Microsoft Yi Baiti"/>
+        <a:font script="Tibt" typeface="Microsoft Himalaya"/>
+        <a:font script="Thaa" typeface="MV Boli"/>
+        <a:font script="Deva" typeface="Mangal"/>
+        <a:font script="Telu" typeface="Gautami"/>
+        <a:font script="Taml" typeface="Latha"/>
+        <a:font script="Syrc" typeface="Estrangelo Edessa"/>
+        <a:font script="Orya" typeface="Kalinga"/>
+        <a:font script="Mlym" typeface="Kartika"/>
+        <a:font script="Laoo" typeface="DokChampa"/>
+        <a:font script="Sinh" typeface="Iskoola Pota"/>
+        <a:font script="Mong" typeface="Mongolian Baiti"/>
+        <a:font script="Viet" typeface="Arial"/>
+        <a:font script="Uigh" typeface="Microsoft Uighur"/>
+        <a:font script="Geor" typeface="Sylfaen"/>
+      </a:minorFont>
+    </a:fontScheme>
+    <a:fmtScheme name="Office">
+      <a:fillStyleLst>
+        <a:solidFill>
+          <a:schemeClr val="phClr"/>
+        </a:solidFill>
+        <a:gradFill rotWithShape="1">
+          <a:gsLst>
+            <a:gs pos="0">
+              <a:schemeClr val="phClr">
+                <a:tint val="50000"/>
+                <a:satMod val="300000"/>
+              </a:schemeClr>
+            </a:gs>
+            <a:gs pos="35000">
+              <a:schemeClr val="phClr">
+                <a:tint val="37000"/>
+                <a:satMod val="300000"/>
+              </a:schemeClr>
+            </a:gs>
+            <a:gs pos="100000">
+              <a:schemeClr val="phClr">
+                <a:tint val="15000"/>
+                <a:satMod val="350000"/>
+              </a:schemeClr>
+            </a:gs>
+          </a:gsLst>
+          <a:lin ang="16200000" scaled="1"/>
+        </a:gradFill>
+        <a:gradFill rotWithShape="1">
+          <a:gsLst>
+            <a:gs pos="0">
+              <a:schemeClr val="phClr">
+                <a:tint val="100000"/>
+                <a:shade val="100000"/>
+                <a:satMod val="130000"/>
+              </a:schemeClr>
+            </a:gs>
+            <a:gs pos="100000">
+              <a:schemeClr val="phClr">
+                <a:tint val="50000"/>
+                <a:shade val="100000"/>
+                <a:satMod val="350000"/>
+              </a:schemeClr>
+            </a:gs>
+          </a:gsLst>
+          <a:lin ang="16200000" scaled="0"/>
+        </a:gradFill>
+      </a:fillStyleLst>
+      <a:lnStyleLst>
+        <a:ln w="9525" cap="flat" cmpd="sng" algn="ctr">
+          <a:solidFill>
+            <a:schemeClr val="phClr">
+              <a:shade val="95000"/>
+              <a:satMod val="105000"/>
+            </a:schemeClr>
+          </a:solidFill>
+          <a:prstDash val="solid"/>
+        </a:ln>
+        <a:ln w="25400" cap="flat" cmpd="sng" algn="ctr">
+          <a:solidFill>
+            <a:schemeClr val="phClr"/>
+          </a:solidFill>
+          <a:prstDash val="solid"/>
+        </a:ln>
+        <a:ln w="38100" cap="flat" cmpd="sng" algn="ctr">
+          <a:solidFill>
+            <a:schemeClr val="phClr"/>
+          </a:solidFill>
+          <a:prstDash val="solid"/>
+        </a:ln>
+      </a:lnStyleLst>
+      <a:effectStyleLst>
+        <a:effectStyle>
+          <a:effectLst>
+            <a:outerShdw blurRad="40000" dist="20000" dir="5400000" rotWithShape="0">
+              <a:srgbClr val="000000">
+                <a:alpha val="38000"/>
+              </a:srgbClr>
+            </a:outerShdw>
+          </a:effectLst>
+        </a:effectStyle>
+        <a:effectStyle>
+          <a:effectLst>
+            <a:outerShdw blurRad="40000" dist="23000" dir="5400000" rotWithShape="0">
+              <a:srgbClr val="000000">
+                <a:alpha val="35000"/>
+              </a:srgbClr>
+            </a:outerShdw>
+          </a:effectLst>
+        </a:effectStyle>
+        <a:effectStyle>
+          <a:effectLst>
+            <a:outerShdw blurRad="40000" dist="23000" dir="5400000" rotWithShape="0">
+              <a:srgbClr val="000000">
+                <a:alpha val="35000"/>
+              </a:srgbClr>
+            </a:outerShdw>
+          </a:effectLst>
+          <a:scene3d>
+            <a:camera prst="orthographicFront">
+              <a:rot lat="0" lon="0" rev="0"/>
+            </a:camera>
+            <a:lightRig rig="threePt" dir="t">
+              <a:rot lat="0" lon="0" rev="1200000"/>
+            </a:lightRig>
+          </a:scene3d>
+          <a:sp3d>
+            <a:bevelT w="63500" h="25400"/>
+          </a:sp3d>
+        </a:effectStyle>
+      </a:effectStyleLst>
+      <a:bgFillStyleLst>
+        <a:solidFill>
+          <a:schemeClr val="phClr"/>
+        </a:solidFill>
+        <a:gradFill rotWithShape="1">
+          <a:gsLst>
+            <a:gs pos="0">
+              <a:schemeClr val="phClr">
+                <a:tint val="40000"/>
+                <a:satMod val="350000"/>
+              </a:schemeClr>
+            </a:gs>
+            <a:gs pos="40000">
+              <a:schemeClr val="phClr">
+                <a:tint val="45000"/>
+                <a:shade val="99000"/>
+                <a:satMod val="350000"/>
+              </a:schemeClr>
+            </a:gs>
+            <a:gs pos="100000">
+              <a:schemeClr val="phClr">
+                <a:shade val="20000"/>
+                <a:satMod val="255000"/>
+              </a:schemeClr>
+            </a:gs>
+          </a:gsLst>
+          <a:path path="circle">
+            <a:fillToRect l="50000" t="-80000" r="50000" b="180000"/>
+          </a:path>
+        </a:gradFill>
+        <a:gradFill rotWithShape="1">
+          <a:gsLst>
+            <a:gs pos="0">
+              <a:schemeClr val="phClr">
+                <a:tint val="80000"/>
+                <a:satMod val="300000"/>
+              </a:schemeClr>
+            </a:gs>
+            <a:gs pos="100000">
+              <a:schemeClr val="phClr">
+                <a:shade val="30000"/>
+                <a:satMod val="200000"/>
+              </a:schemeClr>
+            </a:gs>
+          </a:gsLst>
+          <a:path path="circle">
+            <a:fillToRect l="50000" t="50000" r="50000" b="50000"/>
+          </a:path>
+        </a:gradFill>
+      </a:bgFillStyleLst>
+    </a:fmtScheme>
+  </a:themeElements>
+</a:theme>
+</file>
+
+<file path=ppt/theme/theme2.xml><?xml version="1.0" encoding="utf-8"?>
 <a:theme xmlns:a="http://schemas.openxmlformats.org/drawingml/2006/main" xmlns:r="http://schemas.openxmlformats.org/officeDocument/2006/relationships" name="Shift">
   <a:themeElements>
     <a:clrScheme name="Shift">
@@ -23931,283 +24566,4 @@
     </a:fmtScheme>
   </a:themeElements>
 </a:theme>
-</file>
-
-<file path=ppt/theme/theme2.xml><?xml version="1.0" encoding="utf-8"?>
-<a:theme xmlns:a="http://schemas.openxmlformats.org/drawingml/2006/main" xmlns:r="http://schemas.openxmlformats.org/officeDocument/2006/relationships">
-  <a:themeElements>
-    <a:clrScheme name="Default">
-      <a:dk1>
-        <a:srgbClr val="000000"/>
-      </a:dk1>
-      <a:lt1>
-        <a:srgbClr val="FFFFFF"/>
-      </a:lt1>
-      <a:dk2>
-        <a:srgbClr val="158158"/>
-      </a:dk2>
-      <a:lt2>
-        <a:srgbClr val="F3F3F3"/>
-      </a:lt2>
-      <a:accent1>
-        <a:srgbClr val="058DC7"/>
-      </a:accent1>
-      <a:accent2>
-        <a:srgbClr val="50B432"/>
-      </a:accent2>
-      <a:accent3>
-        <a:srgbClr val="ED561B"/>
-      </a:accent3>
-      <a:accent4>
-        <a:srgbClr val="EDEF00"/>
-      </a:accent4>
-      <a:accent5>
-        <a:srgbClr val="24CBE5"/>
-      </a:accent5>
-      <a:accent6>
-        <a:srgbClr val="64E572"/>
-      </a:accent6>
-      <a:hlink>
-        <a:srgbClr val="2200CC"/>
-      </a:hlink>
-      <a:folHlink>
-        <a:srgbClr val="551A8B"/>
-      </a:folHlink>
-    </a:clrScheme>
-    <a:fontScheme name="Office">
-      <a:majorFont>
-        <a:latin typeface="Arial"/>
-        <a:ea typeface=""/>
-        <a:cs typeface=""/>
-        <a:font script="Jpan" typeface="ＭＳ Ｐゴシック"/>
-        <a:font script="Hang" typeface="맑은 고딕"/>
-        <a:font script="Hans" typeface="宋体"/>
-        <a:font script="Hant" typeface="新細明體"/>
-        <a:font script="Arab" typeface="Times New Roman"/>
-        <a:font script="Hebr" typeface="Times New Roman"/>
-        <a:font script="Thai" typeface="Angsana New"/>
-        <a:font script="Ethi" typeface="Nyala"/>
-        <a:font script="Beng" typeface="Vrinda"/>
-        <a:font script="Gujr" typeface="Shruti"/>
-        <a:font script="Khmr" typeface="MoolBoran"/>
-        <a:font script="Knda" typeface="Tunga"/>
-        <a:font script="Guru" typeface="Raavi"/>
-        <a:font script="Cans" typeface="Euphemia"/>
-        <a:font script="Cher" typeface="Plantagenet Cherokee"/>
-        <a:font script="Yiii" typeface="Microsoft Yi Baiti"/>
-        <a:font script="Tibt" typeface="Microsoft Himalaya"/>
-        <a:font script="Thaa" typeface="MV Boli"/>
-        <a:font script="Deva" typeface="Mangal"/>
-        <a:font script="Telu" typeface="Gautami"/>
-        <a:font script="Taml" typeface="Latha"/>
-        <a:font script="Syrc" typeface="Estrangelo Edessa"/>
-        <a:font script="Orya" typeface="Kalinga"/>
-        <a:font script="Mlym" typeface="Kartika"/>
-        <a:font script="Laoo" typeface="DokChampa"/>
-        <a:font script="Sinh" typeface="Iskoola Pota"/>
-        <a:font script="Mong" typeface="Mongolian Baiti"/>
-        <a:font script="Viet" typeface="Times New Roman"/>
-        <a:font script="Uigh" typeface="Microsoft Uighur"/>
-        <a:font script="Geor" typeface="Sylfaen"/>
-      </a:majorFont>
-      <a:minorFont>
-        <a:latin typeface="Arial"/>
-        <a:ea typeface=""/>
-        <a:cs typeface=""/>
-        <a:font script="Jpan" typeface="ＭＳ Ｐゴシック"/>
-        <a:font script="Hang" typeface="맑은 고딕"/>
-        <a:font script="Hans" typeface="宋体"/>
-        <a:font script="Hant" typeface="新細明體"/>
-        <a:font script="Arab" typeface="Arial"/>
-        <a:font script="Hebr" typeface="Arial"/>
-        <a:font script="Thai" typeface="Cordia New"/>
-        <a:font script="Ethi" typeface="Nyala"/>
-        <a:font script="Beng" typeface="Vrinda"/>
-        <a:font script="Gujr" typeface="Shruti"/>
-        <a:font script="Khmr" typeface="DaunPenh"/>
-        <a:font script="Knda" typeface="Tunga"/>
-        <a:font script="Guru" typeface="Raavi"/>
-        <a:font script="Cans" typeface="Euphemia"/>
-        <a:font script="Cher" typeface="Plantagenet Cherokee"/>
-        <a:font script="Yiii" typeface="Microsoft Yi Baiti"/>
-        <a:font script="Tibt" typeface="Microsoft Himalaya"/>
-        <a:font script="Thaa" typeface="MV Boli"/>
-        <a:font script="Deva" typeface="Mangal"/>
-        <a:font script="Telu" typeface="Gautami"/>
-        <a:font script="Taml" typeface="Latha"/>
-        <a:font script="Syrc" typeface="Estrangelo Edessa"/>
-        <a:font script="Orya" typeface="Kalinga"/>
-        <a:font script="Mlym" typeface="Kartika"/>
-        <a:font script="Laoo" typeface="DokChampa"/>
-        <a:font script="Sinh" typeface="Iskoola Pota"/>
-        <a:font script="Mong" typeface="Mongolian Baiti"/>
-        <a:font script="Viet" typeface="Arial"/>
-        <a:font script="Uigh" typeface="Microsoft Uighur"/>
-        <a:font script="Geor" typeface="Sylfaen"/>
-      </a:minorFont>
-    </a:fontScheme>
-    <a:fmtScheme name="Office">
-      <a:fillStyleLst>
-        <a:solidFill>
-          <a:schemeClr val="phClr"/>
-        </a:solidFill>
-        <a:gradFill rotWithShape="1">
-          <a:gsLst>
-            <a:gs pos="0">
-              <a:schemeClr val="phClr">
-                <a:tint val="50000"/>
-                <a:satMod val="300000"/>
-              </a:schemeClr>
-            </a:gs>
-            <a:gs pos="35000">
-              <a:schemeClr val="phClr">
-                <a:tint val="37000"/>
-                <a:satMod val="300000"/>
-              </a:schemeClr>
-            </a:gs>
-            <a:gs pos="100000">
-              <a:schemeClr val="phClr">
-                <a:tint val="15000"/>
-                <a:satMod val="350000"/>
-              </a:schemeClr>
-            </a:gs>
-          </a:gsLst>
-          <a:lin ang="16200000" scaled="1"/>
-        </a:gradFill>
-        <a:gradFill rotWithShape="1">
-          <a:gsLst>
-            <a:gs pos="0">
-              <a:schemeClr val="phClr">
-                <a:tint val="100000"/>
-                <a:shade val="100000"/>
-                <a:satMod val="130000"/>
-              </a:schemeClr>
-            </a:gs>
-            <a:gs pos="100000">
-              <a:schemeClr val="phClr">
-                <a:tint val="50000"/>
-                <a:shade val="100000"/>
-                <a:satMod val="350000"/>
-              </a:schemeClr>
-            </a:gs>
-          </a:gsLst>
-          <a:lin ang="16200000" scaled="0"/>
-        </a:gradFill>
-      </a:fillStyleLst>
-      <a:lnStyleLst>
-        <a:ln w="9525" cap="flat" cmpd="sng" algn="ctr">
-          <a:solidFill>
-            <a:schemeClr val="phClr">
-              <a:shade val="95000"/>
-              <a:satMod val="105000"/>
-            </a:schemeClr>
-          </a:solidFill>
-          <a:prstDash val="solid"/>
-        </a:ln>
-        <a:ln w="25400" cap="flat" cmpd="sng" algn="ctr">
-          <a:solidFill>
-            <a:schemeClr val="phClr"/>
-          </a:solidFill>
-          <a:prstDash val="solid"/>
-        </a:ln>
-        <a:ln w="38100" cap="flat" cmpd="sng" algn="ctr">
-          <a:solidFill>
-            <a:schemeClr val="phClr"/>
-          </a:solidFill>
-          <a:prstDash val="solid"/>
-        </a:ln>
-      </a:lnStyleLst>
-      <a:effectStyleLst>
-        <a:effectStyle>
-          <a:effectLst>
-            <a:outerShdw blurRad="40000" dist="20000" dir="5400000" rotWithShape="0">
-              <a:srgbClr val="000000">
-                <a:alpha val="38000"/>
-              </a:srgbClr>
-            </a:outerShdw>
-          </a:effectLst>
-        </a:effectStyle>
-        <a:effectStyle>
-          <a:effectLst>
-            <a:outerShdw blurRad="40000" dist="23000" dir="5400000" rotWithShape="0">
-              <a:srgbClr val="000000">
-                <a:alpha val="35000"/>
-              </a:srgbClr>
-            </a:outerShdw>
-          </a:effectLst>
-        </a:effectStyle>
-        <a:effectStyle>
-          <a:effectLst>
-            <a:outerShdw blurRad="40000" dist="23000" dir="5400000" rotWithShape="0">
-              <a:srgbClr val="000000">
-                <a:alpha val="35000"/>
-              </a:srgbClr>
-            </a:outerShdw>
-          </a:effectLst>
-          <a:scene3d>
-            <a:camera prst="orthographicFront">
-              <a:rot lat="0" lon="0" rev="0"/>
-            </a:camera>
-            <a:lightRig rig="threePt" dir="t">
-              <a:rot lat="0" lon="0" rev="1200000"/>
-            </a:lightRig>
-          </a:scene3d>
-          <a:sp3d>
-            <a:bevelT w="63500" h="25400"/>
-          </a:sp3d>
-        </a:effectStyle>
-      </a:effectStyleLst>
-      <a:bgFillStyleLst>
-        <a:solidFill>
-          <a:schemeClr val="phClr"/>
-        </a:solidFill>
-        <a:gradFill rotWithShape="1">
-          <a:gsLst>
-            <a:gs pos="0">
-              <a:schemeClr val="phClr">
-                <a:tint val="40000"/>
-                <a:satMod val="350000"/>
-              </a:schemeClr>
-            </a:gs>
-            <a:gs pos="40000">
-              <a:schemeClr val="phClr">
-                <a:tint val="45000"/>
-                <a:shade val="99000"/>
-                <a:satMod val="350000"/>
-              </a:schemeClr>
-            </a:gs>
-            <a:gs pos="100000">
-              <a:schemeClr val="phClr">
-                <a:shade val="20000"/>
-                <a:satMod val="255000"/>
-              </a:schemeClr>
-            </a:gs>
-          </a:gsLst>
-          <a:path path="circle">
-            <a:fillToRect l="50000" t="-80000" r="50000" b="180000"/>
-          </a:path>
-        </a:gradFill>
-        <a:gradFill rotWithShape="1">
-          <a:gsLst>
-            <a:gs pos="0">
-              <a:schemeClr val="phClr">
-                <a:tint val="80000"/>
-                <a:satMod val="300000"/>
-              </a:schemeClr>
-            </a:gs>
-            <a:gs pos="100000">
-              <a:schemeClr val="phClr">
-                <a:shade val="30000"/>
-                <a:satMod val="200000"/>
-              </a:schemeClr>
-            </a:gs>
-          </a:gsLst>
-          <a:path path="circle">
-            <a:fillToRect l="50000" t="50000" r="50000" b="50000"/>
-          </a:path>
-        </a:gradFill>
-      </a:bgFillStyleLst>
-    </a:fmtScheme>
-  </a:themeElements>
-</a:theme>
 </file>
</xml_diff>

<commit_message>
Upload after presenting, with all speaking notes
</commit_message>
<xml_diff>
--- a/Presentation/Project 1.pptx
+++ b/Presentation/Project 1.pptx
@@ -1039,6 +1039,38 @@
             <a:r>
               <a:rPr lang="en"/>
               <a:t> noise as well as using rolling mean and standard deviation. Using these techniques we were able to better capture the significant peaks of the VIX</a:t>
+            </a:r>
+            <a:endParaRPr/>
+          </a:p>
+          <a:p>
+            <a:pPr indent="0" lvl="0" marL="0" rtl="0" algn="l">
+              <a:spcBef>
+                <a:spcPts val="0"/>
+              </a:spcBef>
+              <a:spcAft>
+                <a:spcPts val="0"/>
+              </a:spcAft>
+              <a:buNone/>
+            </a:pPr>
+            <a:r>
+              <a:rPr lang="en"/>
+              <a:t>*</a:t>
+            </a:r>
+            <a:endParaRPr/>
+          </a:p>
+          <a:p>
+            <a:pPr indent="0" lvl="0" marL="0" rtl="0" algn="l">
+              <a:spcBef>
+                <a:spcPts val="0"/>
+              </a:spcBef>
+              <a:spcAft>
+                <a:spcPts val="0"/>
+              </a:spcAft>
+              <a:buNone/>
+            </a:pPr>
+            <a:r>
+              <a:rPr lang="en"/>
+              <a:t>One of the first things we look at is the space between these peaks, we see, on average the number of days between peaks is 30 Calendar Days</a:t>
             </a:r>
             <a:endParaRPr/>
           </a:p>
@@ -24011,6 +24043,285 @@
 </file>
 
 <file path=ppt/theme/theme1.xml><?xml version="1.0" encoding="utf-8"?>
+<a:theme xmlns:a="http://schemas.openxmlformats.org/drawingml/2006/main" xmlns:r="http://schemas.openxmlformats.org/officeDocument/2006/relationships" name="Shift">
+  <a:themeElements>
+    <a:clrScheme name="Shift">
+      <a:dk1>
+        <a:srgbClr val="FFFFFF"/>
+      </a:dk1>
+      <a:lt1>
+        <a:srgbClr val="AF7B51"/>
+      </a:lt1>
+      <a:dk2>
+        <a:srgbClr val="233A44"/>
+      </a:dk2>
+      <a:lt2>
+        <a:srgbClr val="D9D9D9"/>
+      </a:lt2>
+      <a:accent1>
+        <a:srgbClr val="00796B"/>
+      </a:accent1>
+      <a:accent2>
+        <a:srgbClr val="D9563F"/>
+      </a:accent2>
+      <a:accent3>
+        <a:srgbClr val="C4A15A"/>
+      </a:accent3>
+      <a:accent4>
+        <a:srgbClr val="14F597"/>
+      </a:accent4>
+      <a:accent5>
+        <a:srgbClr val="3D4594"/>
+      </a:accent5>
+      <a:accent6>
+        <a:srgbClr val="163EF5"/>
+      </a:accent6>
+      <a:hlink>
+        <a:srgbClr val="3D4594"/>
+      </a:hlink>
+      <a:folHlink>
+        <a:srgbClr val="3D4594"/>
+      </a:folHlink>
+    </a:clrScheme>
+    <a:fontScheme name="Office">
+      <a:majorFont>
+        <a:latin typeface="Arial"/>
+        <a:ea typeface=""/>
+        <a:cs typeface=""/>
+        <a:font script="Jpan" typeface="ＭＳ Ｐゴシック"/>
+        <a:font script="Hang" typeface="맑은 고딕"/>
+        <a:font script="Hans" typeface="宋体"/>
+        <a:font script="Hant" typeface="新細明體"/>
+        <a:font script="Arab" typeface="Times New Roman"/>
+        <a:font script="Hebr" typeface="Times New Roman"/>
+        <a:font script="Thai" typeface="Angsana New"/>
+        <a:font script="Ethi" typeface="Nyala"/>
+        <a:font script="Beng" typeface="Vrinda"/>
+        <a:font script="Gujr" typeface="Shruti"/>
+        <a:font script="Khmr" typeface="MoolBoran"/>
+        <a:font script="Knda" typeface="Tunga"/>
+        <a:font script="Guru" typeface="Raavi"/>
+        <a:font script="Cans" typeface="Euphemia"/>
+        <a:font script="Cher" typeface="Plantagenet Cherokee"/>
+        <a:font script="Yiii" typeface="Microsoft Yi Baiti"/>
+        <a:font script="Tibt" typeface="Microsoft Himalaya"/>
+        <a:font script="Thaa" typeface="MV Boli"/>
+        <a:font script="Deva" typeface="Mangal"/>
+        <a:font script="Telu" typeface="Gautami"/>
+        <a:font script="Taml" typeface="Latha"/>
+        <a:font script="Syrc" typeface="Estrangelo Edessa"/>
+        <a:font script="Orya" typeface="Kalinga"/>
+        <a:font script="Mlym" typeface="Kartika"/>
+        <a:font script="Laoo" typeface="DokChampa"/>
+        <a:font script="Sinh" typeface="Iskoola Pota"/>
+        <a:font script="Mong" typeface="Mongolian Baiti"/>
+        <a:font script="Viet" typeface="Times New Roman"/>
+        <a:font script="Uigh" typeface="Microsoft Uighur"/>
+        <a:font script="Geor" typeface="Sylfaen"/>
+      </a:majorFont>
+      <a:minorFont>
+        <a:latin typeface="Arial"/>
+        <a:ea typeface=""/>
+        <a:cs typeface=""/>
+        <a:font script="Jpan" typeface="ＭＳ Ｐゴシック"/>
+        <a:font script="Hang" typeface="맑은 고딕"/>
+        <a:font script="Hans" typeface="宋体"/>
+        <a:font script="Hant" typeface="新細明體"/>
+        <a:font script="Arab" typeface="Arial"/>
+        <a:font script="Hebr" typeface="Arial"/>
+        <a:font script="Thai" typeface="Cordia New"/>
+        <a:font script="Ethi" typeface="Nyala"/>
+        <a:font script="Beng" typeface="Vrinda"/>
+        <a:font script="Gujr" typeface="Shruti"/>
+        <a:font script="Khmr" typeface="DaunPenh"/>
+        <a:font script="Knda" typeface="Tunga"/>
+        <a:font script="Guru" typeface="Raavi"/>
+        <a:font script="Cans" typeface="Euphemia"/>
+        <a:font script="Cher" typeface="Plantagenet Cherokee"/>
+        <a:font script="Yiii" typeface="Microsoft Yi Baiti"/>
+        <a:font script="Tibt" typeface="Microsoft Himalaya"/>
+        <a:font script="Thaa" typeface="MV Boli"/>
+        <a:font script="Deva" typeface="Mangal"/>
+        <a:font script="Telu" typeface="Gautami"/>
+        <a:font script="Taml" typeface="Latha"/>
+        <a:font script="Syrc" typeface="Estrangelo Edessa"/>
+        <a:font script="Orya" typeface="Kalinga"/>
+        <a:font script="Mlym" typeface="Kartika"/>
+        <a:font script="Laoo" typeface="DokChampa"/>
+        <a:font script="Sinh" typeface="Iskoola Pota"/>
+        <a:font script="Mong" typeface="Mongolian Baiti"/>
+        <a:font script="Viet" typeface="Arial"/>
+        <a:font script="Uigh" typeface="Microsoft Uighur"/>
+        <a:font script="Geor" typeface="Sylfaen"/>
+      </a:minorFont>
+    </a:fontScheme>
+    <a:fmtScheme name="Office">
+      <a:fillStyleLst>
+        <a:solidFill>
+          <a:schemeClr val="phClr"/>
+        </a:solidFill>
+        <a:gradFill rotWithShape="1">
+          <a:gsLst>
+            <a:gs pos="0">
+              <a:schemeClr val="phClr">
+                <a:tint val="50000"/>
+                <a:satMod val="300000"/>
+              </a:schemeClr>
+            </a:gs>
+            <a:gs pos="35000">
+              <a:schemeClr val="phClr">
+                <a:tint val="37000"/>
+                <a:satMod val="300000"/>
+              </a:schemeClr>
+            </a:gs>
+            <a:gs pos="100000">
+              <a:schemeClr val="phClr">
+                <a:tint val="15000"/>
+                <a:satMod val="350000"/>
+              </a:schemeClr>
+            </a:gs>
+          </a:gsLst>
+          <a:lin ang="16200000" scaled="1"/>
+        </a:gradFill>
+        <a:gradFill rotWithShape="1">
+          <a:gsLst>
+            <a:gs pos="0">
+              <a:schemeClr val="phClr">
+                <a:tint val="100000"/>
+                <a:shade val="100000"/>
+                <a:satMod val="130000"/>
+              </a:schemeClr>
+            </a:gs>
+            <a:gs pos="100000">
+              <a:schemeClr val="phClr">
+                <a:tint val="50000"/>
+                <a:shade val="100000"/>
+                <a:satMod val="350000"/>
+              </a:schemeClr>
+            </a:gs>
+          </a:gsLst>
+          <a:lin ang="16200000" scaled="0"/>
+        </a:gradFill>
+      </a:fillStyleLst>
+      <a:lnStyleLst>
+        <a:ln w="9525" cap="flat" cmpd="sng" algn="ctr">
+          <a:solidFill>
+            <a:schemeClr val="phClr">
+              <a:shade val="95000"/>
+              <a:satMod val="105000"/>
+            </a:schemeClr>
+          </a:solidFill>
+          <a:prstDash val="solid"/>
+        </a:ln>
+        <a:ln w="25400" cap="flat" cmpd="sng" algn="ctr">
+          <a:solidFill>
+            <a:schemeClr val="phClr"/>
+          </a:solidFill>
+          <a:prstDash val="solid"/>
+        </a:ln>
+        <a:ln w="38100" cap="flat" cmpd="sng" algn="ctr">
+          <a:solidFill>
+            <a:schemeClr val="phClr"/>
+          </a:solidFill>
+          <a:prstDash val="solid"/>
+        </a:ln>
+      </a:lnStyleLst>
+      <a:effectStyleLst>
+        <a:effectStyle>
+          <a:effectLst>
+            <a:outerShdw blurRad="40000" dist="20000" dir="5400000" rotWithShape="0">
+              <a:srgbClr val="000000">
+                <a:alpha val="38000"/>
+              </a:srgbClr>
+            </a:outerShdw>
+          </a:effectLst>
+        </a:effectStyle>
+        <a:effectStyle>
+          <a:effectLst>
+            <a:outerShdw blurRad="40000" dist="23000" dir="5400000" rotWithShape="0">
+              <a:srgbClr val="000000">
+                <a:alpha val="35000"/>
+              </a:srgbClr>
+            </a:outerShdw>
+          </a:effectLst>
+        </a:effectStyle>
+        <a:effectStyle>
+          <a:effectLst>
+            <a:outerShdw blurRad="40000" dist="23000" dir="5400000" rotWithShape="0">
+              <a:srgbClr val="000000">
+                <a:alpha val="35000"/>
+              </a:srgbClr>
+            </a:outerShdw>
+          </a:effectLst>
+          <a:scene3d>
+            <a:camera prst="orthographicFront">
+              <a:rot lat="0" lon="0" rev="0"/>
+            </a:camera>
+            <a:lightRig rig="threePt" dir="t">
+              <a:rot lat="0" lon="0" rev="1200000"/>
+            </a:lightRig>
+          </a:scene3d>
+          <a:sp3d>
+            <a:bevelT w="63500" h="25400"/>
+          </a:sp3d>
+        </a:effectStyle>
+      </a:effectStyleLst>
+      <a:bgFillStyleLst>
+        <a:solidFill>
+          <a:schemeClr val="phClr"/>
+        </a:solidFill>
+        <a:gradFill rotWithShape="1">
+          <a:gsLst>
+            <a:gs pos="0">
+              <a:schemeClr val="phClr">
+                <a:tint val="40000"/>
+                <a:satMod val="350000"/>
+              </a:schemeClr>
+            </a:gs>
+            <a:gs pos="40000">
+              <a:schemeClr val="phClr">
+                <a:tint val="45000"/>
+                <a:shade val="99000"/>
+                <a:satMod val="350000"/>
+              </a:schemeClr>
+            </a:gs>
+            <a:gs pos="100000">
+              <a:schemeClr val="phClr">
+                <a:shade val="20000"/>
+                <a:satMod val="255000"/>
+              </a:schemeClr>
+            </a:gs>
+          </a:gsLst>
+          <a:path path="circle">
+            <a:fillToRect l="50000" t="-80000" r="50000" b="180000"/>
+          </a:path>
+        </a:gradFill>
+        <a:gradFill rotWithShape="1">
+          <a:gsLst>
+            <a:gs pos="0">
+              <a:schemeClr val="phClr">
+                <a:tint val="80000"/>
+                <a:satMod val="300000"/>
+              </a:schemeClr>
+            </a:gs>
+            <a:gs pos="100000">
+              <a:schemeClr val="phClr">
+                <a:shade val="30000"/>
+                <a:satMod val="200000"/>
+              </a:schemeClr>
+            </a:gs>
+          </a:gsLst>
+          <a:path path="circle">
+            <a:fillToRect l="50000" t="50000" r="50000" b="50000"/>
+          </a:path>
+        </a:gradFill>
+      </a:bgFillStyleLst>
+    </a:fmtScheme>
+  </a:themeElements>
+</a:theme>
+</file>
+
+<file path=ppt/theme/theme2.xml><?xml version="1.0" encoding="utf-8"?>
 <a:theme xmlns:a="http://schemas.openxmlformats.org/drawingml/2006/main" xmlns:r="http://schemas.openxmlformats.org/officeDocument/2006/relationships">
   <a:themeElements>
     <a:clrScheme name="Default">
@@ -24287,283 +24598,4 @@
     </a:fmtScheme>
   </a:themeElements>
 </a:theme>
-</file>
-
-<file path=ppt/theme/theme2.xml><?xml version="1.0" encoding="utf-8"?>
-<a:theme xmlns:a="http://schemas.openxmlformats.org/drawingml/2006/main" xmlns:r="http://schemas.openxmlformats.org/officeDocument/2006/relationships" name="Shift">
-  <a:themeElements>
-    <a:clrScheme name="Shift">
-      <a:dk1>
-        <a:srgbClr val="FFFFFF"/>
-      </a:dk1>
-      <a:lt1>
-        <a:srgbClr val="AF7B51"/>
-      </a:lt1>
-      <a:dk2>
-        <a:srgbClr val="233A44"/>
-      </a:dk2>
-      <a:lt2>
-        <a:srgbClr val="D9D9D9"/>
-      </a:lt2>
-      <a:accent1>
-        <a:srgbClr val="00796B"/>
-      </a:accent1>
-      <a:accent2>
-        <a:srgbClr val="D9563F"/>
-      </a:accent2>
-      <a:accent3>
-        <a:srgbClr val="C4A15A"/>
-      </a:accent3>
-      <a:accent4>
-        <a:srgbClr val="14F597"/>
-      </a:accent4>
-      <a:accent5>
-        <a:srgbClr val="3D4594"/>
-      </a:accent5>
-      <a:accent6>
-        <a:srgbClr val="163EF5"/>
-      </a:accent6>
-      <a:hlink>
-        <a:srgbClr val="3D4594"/>
-      </a:hlink>
-      <a:folHlink>
-        <a:srgbClr val="3D4594"/>
-      </a:folHlink>
-    </a:clrScheme>
-    <a:fontScheme name="Office">
-      <a:majorFont>
-        <a:latin typeface="Arial"/>
-        <a:ea typeface=""/>
-        <a:cs typeface=""/>
-        <a:font script="Jpan" typeface="ＭＳ Ｐゴシック"/>
-        <a:font script="Hang" typeface="맑은 고딕"/>
-        <a:font script="Hans" typeface="宋体"/>
-        <a:font script="Hant" typeface="新細明體"/>
-        <a:font script="Arab" typeface="Times New Roman"/>
-        <a:font script="Hebr" typeface="Times New Roman"/>
-        <a:font script="Thai" typeface="Angsana New"/>
-        <a:font script="Ethi" typeface="Nyala"/>
-        <a:font script="Beng" typeface="Vrinda"/>
-        <a:font script="Gujr" typeface="Shruti"/>
-        <a:font script="Khmr" typeface="MoolBoran"/>
-        <a:font script="Knda" typeface="Tunga"/>
-        <a:font script="Guru" typeface="Raavi"/>
-        <a:font script="Cans" typeface="Euphemia"/>
-        <a:font script="Cher" typeface="Plantagenet Cherokee"/>
-        <a:font script="Yiii" typeface="Microsoft Yi Baiti"/>
-        <a:font script="Tibt" typeface="Microsoft Himalaya"/>
-        <a:font script="Thaa" typeface="MV Boli"/>
-        <a:font script="Deva" typeface="Mangal"/>
-        <a:font script="Telu" typeface="Gautami"/>
-        <a:font script="Taml" typeface="Latha"/>
-        <a:font script="Syrc" typeface="Estrangelo Edessa"/>
-        <a:font script="Orya" typeface="Kalinga"/>
-        <a:font script="Mlym" typeface="Kartika"/>
-        <a:font script="Laoo" typeface="DokChampa"/>
-        <a:font script="Sinh" typeface="Iskoola Pota"/>
-        <a:font script="Mong" typeface="Mongolian Baiti"/>
-        <a:font script="Viet" typeface="Times New Roman"/>
-        <a:font script="Uigh" typeface="Microsoft Uighur"/>
-        <a:font script="Geor" typeface="Sylfaen"/>
-      </a:majorFont>
-      <a:minorFont>
-        <a:latin typeface="Arial"/>
-        <a:ea typeface=""/>
-        <a:cs typeface=""/>
-        <a:font script="Jpan" typeface="ＭＳ Ｐゴシック"/>
-        <a:font script="Hang" typeface="맑은 고딕"/>
-        <a:font script="Hans" typeface="宋体"/>
-        <a:font script="Hant" typeface="新細明體"/>
-        <a:font script="Arab" typeface="Arial"/>
-        <a:font script="Hebr" typeface="Arial"/>
-        <a:font script="Thai" typeface="Cordia New"/>
-        <a:font script="Ethi" typeface="Nyala"/>
-        <a:font script="Beng" typeface="Vrinda"/>
-        <a:font script="Gujr" typeface="Shruti"/>
-        <a:font script="Khmr" typeface="DaunPenh"/>
-        <a:font script="Knda" typeface="Tunga"/>
-        <a:font script="Guru" typeface="Raavi"/>
-        <a:font script="Cans" typeface="Euphemia"/>
-        <a:font script="Cher" typeface="Plantagenet Cherokee"/>
-        <a:font script="Yiii" typeface="Microsoft Yi Baiti"/>
-        <a:font script="Tibt" typeface="Microsoft Himalaya"/>
-        <a:font script="Thaa" typeface="MV Boli"/>
-        <a:font script="Deva" typeface="Mangal"/>
-        <a:font script="Telu" typeface="Gautami"/>
-        <a:font script="Taml" typeface="Latha"/>
-        <a:font script="Syrc" typeface="Estrangelo Edessa"/>
-        <a:font script="Orya" typeface="Kalinga"/>
-        <a:font script="Mlym" typeface="Kartika"/>
-        <a:font script="Laoo" typeface="DokChampa"/>
-        <a:font script="Sinh" typeface="Iskoola Pota"/>
-        <a:font script="Mong" typeface="Mongolian Baiti"/>
-        <a:font script="Viet" typeface="Arial"/>
-        <a:font script="Uigh" typeface="Microsoft Uighur"/>
-        <a:font script="Geor" typeface="Sylfaen"/>
-      </a:minorFont>
-    </a:fontScheme>
-    <a:fmtScheme name="Office">
-      <a:fillStyleLst>
-        <a:solidFill>
-          <a:schemeClr val="phClr"/>
-        </a:solidFill>
-        <a:gradFill rotWithShape="1">
-          <a:gsLst>
-            <a:gs pos="0">
-              <a:schemeClr val="phClr">
-                <a:tint val="50000"/>
-                <a:satMod val="300000"/>
-              </a:schemeClr>
-            </a:gs>
-            <a:gs pos="35000">
-              <a:schemeClr val="phClr">
-                <a:tint val="37000"/>
-                <a:satMod val="300000"/>
-              </a:schemeClr>
-            </a:gs>
-            <a:gs pos="100000">
-              <a:schemeClr val="phClr">
-                <a:tint val="15000"/>
-                <a:satMod val="350000"/>
-              </a:schemeClr>
-            </a:gs>
-          </a:gsLst>
-          <a:lin ang="16200000" scaled="1"/>
-        </a:gradFill>
-        <a:gradFill rotWithShape="1">
-          <a:gsLst>
-            <a:gs pos="0">
-              <a:schemeClr val="phClr">
-                <a:tint val="100000"/>
-                <a:shade val="100000"/>
-                <a:satMod val="130000"/>
-              </a:schemeClr>
-            </a:gs>
-            <a:gs pos="100000">
-              <a:schemeClr val="phClr">
-                <a:tint val="50000"/>
-                <a:shade val="100000"/>
-                <a:satMod val="350000"/>
-              </a:schemeClr>
-            </a:gs>
-          </a:gsLst>
-          <a:lin ang="16200000" scaled="0"/>
-        </a:gradFill>
-      </a:fillStyleLst>
-      <a:lnStyleLst>
-        <a:ln w="9525" cap="flat" cmpd="sng" algn="ctr">
-          <a:solidFill>
-            <a:schemeClr val="phClr">
-              <a:shade val="95000"/>
-              <a:satMod val="105000"/>
-            </a:schemeClr>
-          </a:solidFill>
-          <a:prstDash val="solid"/>
-        </a:ln>
-        <a:ln w="25400" cap="flat" cmpd="sng" algn="ctr">
-          <a:solidFill>
-            <a:schemeClr val="phClr"/>
-          </a:solidFill>
-          <a:prstDash val="solid"/>
-        </a:ln>
-        <a:ln w="38100" cap="flat" cmpd="sng" algn="ctr">
-          <a:solidFill>
-            <a:schemeClr val="phClr"/>
-          </a:solidFill>
-          <a:prstDash val="solid"/>
-        </a:ln>
-      </a:lnStyleLst>
-      <a:effectStyleLst>
-        <a:effectStyle>
-          <a:effectLst>
-            <a:outerShdw blurRad="40000" dist="20000" dir="5400000" rotWithShape="0">
-              <a:srgbClr val="000000">
-                <a:alpha val="38000"/>
-              </a:srgbClr>
-            </a:outerShdw>
-          </a:effectLst>
-        </a:effectStyle>
-        <a:effectStyle>
-          <a:effectLst>
-            <a:outerShdw blurRad="40000" dist="23000" dir="5400000" rotWithShape="0">
-              <a:srgbClr val="000000">
-                <a:alpha val="35000"/>
-              </a:srgbClr>
-            </a:outerShdw>
-          </a:effectLst>
-        </a:effectStyle>
-        <a:effectStyle>
-          <a:effectLst>
-            <a:outerShdw blurRad="40000" dist="23000" dir="5400000" rotWithShape="0">
-              <a:srgbClr val="000000">
-                <a:alpha val="35000"/>
-              </a:srgbClr>
-            </a:outerShdw>
-          </a:effectLst>
-          <a:scene3d>
-            <a:camera prst="orthographicFront">
-              <a:rot lat="0" lon="0" rev="0"/>
-            </a:camera>
-            <a:lightRig rig="threePt" dir="t">
-              <a:rot lat="0" lon="0" rev="1200000"/>
-            </a:lightRig>
-          </a:scene3d>
-          <a:sp3d>
-            <a:bevelT w="63500" h="25400"/>
-          </a:sp3d>
-        </a:effectStyle>
-      </a:effectStyleLst>
-      <a:bgFillStyleLst>
-        <a:solidFill>
-          <a:schemeClr val="phClr"/>
-        </a:solidFill>
-        <a:gradFill rotWithShape="1">
-          <a:gsLst>
-            <a:gs pos="0">
-              <a:schemeClr val="phClr">
-                <a:tint val="40000"/>
-                <a:satMod val="350000"/>
-              </a:schemeClr>
-            </a:gs>
-            <a:gs pos="40000">
-              <a:schemeClr val="phClr">
-                <a:tint val="45000"/>
-                <a:shade val="99000"/>
-                <a:satMod val="350000"/>
-              </a:schemeClr>
-            </a:gs>
-            <a:gs pos="100000">
-              <a:schemeClr val="phClr">
-                <a:shade val="20000"/>
-                <a:satMod val="255000"/>
-              </a:schemeClr>
-            </a:gs>
-          </a:gsLst>
-          <a:path path="circle">
-            <a:fillToRect l="50000" t="-80000" r="50000" b="180000"/>
-          </a:path>
-        </a:gradFill>
-        <a:gradFill rotWithShape="1">
-          <a:gsLst>
-            <a:gs pos="0">
-              <a:schemeClr val="phClr">
-                <a:tint val="80000"/>
-                <a:satMod val="300000"/>
-              </a:schemeClr>
-            </a:gs>
-            <a:gs pos="100000">
-              <a:schemeClr val="phClr">
-                <a:shade val="30000"/>
-                <a:satMod val="200000"/>
-              </a:schemeClr>
-            </a:gs>
-          </a:gsLst>
-          <a:path path="circle">
-            <a:fillToRect l="50000" t="50000" r="50000" b="50000"/>
-          </a:path>
-        </a:gradFill>
-      </a:bgFillStyleLst>
-    </a:fmtScheme>
-  </a:themeElements>
-</a:theme>
 </file>
</xml_diff>